<commit_message>
prototype presentation work and some pngcrushin'
</commit_message>
<xml_diff>
--- a/documents/PresentationPrototype.pptx
+++ b/documents/PresentationPrototype.pptx
@@ -1,14 +1,37 @@
 
 <file path=ppt/presentation.xml><?xml version="1.0" encoding="utf-8"?>
-<p:presentation xmlns:a="http://schemas.openxmlformats.org/drawingml/2006/main" xmlns:r="http://schemas.openxmlformats.org/officeDocument/2006/relationships" xmlns:p="http://schemas.openxmlformats.org/presentationml/2006/main" saveSubsetFonts="1">
+<p:presentation xmlns:a="http://schemas.openxmlformats.org/drawingml/2006/main" xmlns:r="http://schemas.openxmlformats.org/officeDocument/2006/relationships" xmlns:p="http://schemas.openxmlformats.org/presentationml/2006/main" embedTrueTypeFonts="1">
   <p:sldMasterIdLst>
-    <p:sldMasterId id="2147483648" r:id="rId1"/>
+    <p:sldMasterId id="2147483672" r:id="rId1"/>
   </p:sldMasterIdLst>
   <p:sldIdLst>
     <p:sldId id="256" r:id="rId2"/>
+    <p:sldId id="257" r:id="rId3"/>
+    <p:sldId id="260" r:id="rId4"/>
+    <p:sldId id="258" r:id="rId5"/>
+    <p:sldId id="259" r:id="rId6"/>
   </p:sldIdLst>
   <p:sldSz cx="9144000" cy="6858000" type="screen4x3"/>
   <p:notesSz cx="6858000" cy="9144000"/>
+  <p:embeddedFontLst>
+    <p:embeddedFont>
+      <p:font typeface="HelveticaNeueLT Com 95 Blk" pitchFamily="34" charset="0"/>
+      <p:bold r:id="rId7"/>
+      <p:boldItalic r:id="rId8"/>
+    </p:embeddedFont>
+    <p:embeddedFont>
+      <p:font typeface="Calibri" pitchFamily="34" charset="0"/>
+      <p:regular r:id="rId9"/>
+      <p:bold r:id="rId10"/>
+      <p:italic r:id="rId11"/>
+      <p:boldItalic r:id="rId12"/>
+    </p:embeddedFont>
+    <p:embeddedFont>
+      <p:font typeface="HelveticaNeueLT Com 97 BlkCn" pitchFamily="34" charset="0"/>
+      <p:bold r:id="rId13"/>
+      <p:boldItalic r:id="rId14"/>
+    </p:embeddedFont>
+  </p:embeddedFontLst>
   <p:defaultTextStyle>
     <a:defPPr>
       <a:defRPr lang="en-US"/>
@@ -136,19 +159,52 @@
         </p:nvSpPr>
         <p:spPr>
           <a:xfrm>
-            <a:off x="685800" y="2130425"/>
-            <a:ext cx="7772400" cy="1470025"/>
+            <a:off x="-76200" y="2130426"/>
+            <a:ext cx="9296400" cy="1470025"/>
           </a:xfrm>
+          <a:blipFill dpi="0" rotWithShape="1">
+            <a:blip r:embed="rId2"/>
+            <a:srcRect/>
+            <a:tile tx="0" ty="0" sx="100000" sy="100000" flip="none" algn="tl"/>
+          </a:blipFill>
+          <a:effectLst>
+            <a:glow rad="101600">
+              <a:srgbClr val="8A9AA1">
+                <a:alpha val="52000"/>
+              </a:srgbClr>
+            </a:glow>
+            <a:innerShdw blurRad="406400">
+              <a:prstClr val="black"/>
+            </a:innerShdw>
+          </a:effectLst>
         </p:spPr>
         <p:txBody>
-          <a:bodyPr/>
-          <a:lstStyle/>
+          <a:bodyPr>
+            <a:noAutofit/>
+          </a:bodyPr>
+          <a:lstStyle>
+            <a:lvl1pPr>
+              <a:defRPr sz="8000" b="0" strike="noStrike" cap="none" spc="-400" normalizeH="0" baseline="0">
+                <a:solidFill>
+                  <a:schemeClr val="bg1"/>
+                </a:solidFill>
+                <a:effectLst>
+                  <a:outerShdw blurRad="38100" dist="38100" dir="2700000" algn="tl">
+                    <a:srgbClr val="000000">
+                      <a:alpha val="43137"/>
+                    </a:srgbClr>
+                  </a:outerShdw>
+                </a:effectLst>
+                <a:latin typeface="HelveticaNeueLT Com 95 Blk" pitchFamily="34" charset="0"/>
+              </a:defRPr>
+            </a:lvl1pPr>
+          </a:lstStyle>
           <a:p>
             <a:r>
               <a:rPr lang="en-US" smtClean="0"/>
               <a:t>Click to edit Master title style</a:t>
             </a:r>
-            <a:endParaRPr lang="en-US"/>
+            <a:endParaRPr lang="en-US" dirty="0"/>
           </a:p>
         </p:txBody>
       </p:sp>
@@ -175,10 +231,9 @@
               <a:buNone/>
               <a:defRPr>
                 <a:solidFill>
-                  <a:schemeClr val="tx1">
-                    <a:tint val="75000"/>
-                  </a:schemeClr>
+                  <a:srgbClr val="8A9AA1"/>
                 </a:solidFill>
+                <a:latin typeface="Helvetica LT Std Cond" pitchFamily="34" charset="0"/>
               </a:defRPr>
             </a:lvl1pPr>
             <a:lvl2pPr marL="457200" indent="0" algn="ctr">
@@ -267,7 +322,7 @@
               <a:rPr lang="en-US" smtClean="0"/>
               <a:t>Click to edit Master subtitle style</a:t>
             </a:r>
-            <a:endParaRPr lang="en-US"/>
+            <a:endParaRPr lang="en-US" dirty="0"/>
           </a:p>
         </p:txBody>
       </p:sp>
@@ -288,7 +343,8 @@
           <a:p>
             <a:fld id="{2F5BB042-2B17-413A-8BB2-6FDBD0381532}" type="datetimeFigureOut">
               <a:rPr lang="en-US" smtClean="0"/>
-              <a:t>8/12/2012</a:t>
+              <a:pPr/>
+              <a:t>10/10/2012</a:t>
             </a:fld>
             <a:endParaRPr lang="en-US"/>
           </a:p>
@@ -330,6 +386,7 @@
           <a:p>
             <a:fld id="{F130C7C2-E2F1-465B-8C07-FB00D7F0D149}" type="slidenum">
               <a:rPr lang="en-US" smtClean="0"/>
+              <a:pPr/>
               <a:t>‹#›</a:t>
             </a:fld>
             <a:endParaRPr lang="en-US"/>
@@ -339,13 +396,32 @@
     </p:spTree>
     <p:extLst>
       <p:ext uri="{BB962C8B-B14F-4D97-AF65-F5344CB8AC3E}">
-        <p14:creationId xmlns:p14="http://schemas.microsoft.com/office/powerpoint/2010/main" val="3273624217"/>
+        <p14:creationId xmlns:p14="http://schemas.microsoft.com/office/powerpoint/2010/main" val="1098947571"/>
       </p:ext>
     </p:extLst>
   </p:cSld>
   <p:clrMapOvr>
     <a:masterClrMapping/>
   </p:clrMapOvr>
+  <mc:AlternateContent xmlns:mc="http://schemas.openxmlformats.org/markup-compatibility/2006" xmlns:p14="http://schemas.microsoft.com/office/powerpoint/2010/main">
+    <mc:Choice Requires="p14">
+      <p:transition p14:dur="60">
+        <p:fade/>
+      </p:transition>
+    </mc:Choice>
+    <mc:Fallback xmlns="">
+      <p:transition>
+        <p:fade/>
+      </p:transition>
+    </mc:Fallback>
+  </mc:AlternateContent>
+  <p:timing>
+    <p:tnLst>
+      <p:par>
+        <p:cTn id="1" dur="indefinite" restart="never" nodeType="tmRoot"/>
+      </p:par>
+    </p:tnLst>
+  </p:timing>
 </p:sldLayout>
 </file>
 
@@ -458,7 +534,7 @@
           <a:p>
             <a:fld id="{2F5BB042-2B17-413A-8BB2-6FDBD0381532}" type="datetimeFigureOut">
               <a:rPr lang="en-US" smtClean="0"/>
-              <a:t>8/12/2012</a:t>
+              <a:t>10/10/2012</a:t>
             </a:fld>
             <a:endParaRPr lang="en-US"/>
           </a:p>
@@ -509,13 +585,32 @@
     </p:spTree>
     <p:extLst>
       <p:ext uri="{BB962C8B-B14F-4D97-AF65-F5344CB8AC3E}">
-        <p14:creationId xmlns:p14="http://schemas.microsoft.com/office/powerpoint/2010/main" val="2083374727"/>
+        <p14:creationId xmlns:p14="http://schemas.microsoft.com/office/powerpoint/2010/main" val="3768190624"/>
       </p:ext>
     </p:extLst>
   </p:cSld>
   <p:clrMapOvr>
     <a:masterClrMapping/>
   </p:clrMapOvr>
+  <mc:AlternateContent xmlns:mc="http://schemas.openxmlformats.org/markup-compatibility/2006" xmlns:p14="http://schemas.microsoft.com/office/powerpoint/2010/main">
+    <mc:Choice Requires="p14">
+      <p:transition p14:dur="60">
+        <p:fade/>
+      </p:transition>
+    </mc:Choice>
+    <mc:Fallback xmlns="">
+      <p:transition>
+        <p:fade/>
+      </p:transition>
+    </mc:Fallback>
+  </mc:AlternateContent>
+  <p:timing>
+    <p:tnLst>
+      <p:par>
+        <p:cTn id="1" dur="indefinite" restart="never" nodeType="tmRoot"/>
+      </p:par>
+    </p:tnLst>
+  </p:timing>
 </p:sldLayout>
 </file>
 
@@ -548,7 +643,7 @@
         </p:nvSpPr>
         <p:spPr>
           <a:xfrm>
-            <a:off x="6629400" y="274638"/>
+            <a:off x="6629400" y="274639"/>
             <a:ext cx="2057400" cy="5851525"/>
           </a:xfrm>
         </p:spPr>
@@ -576,7 +671,7 @@
         </p:nvSpPr>
         <p:spPr>
           <a:xfrm>
-            <a:off x="457200" y="274638"/>
+            <a:off x="457200" y="274639"/>
             <a:ext cx="6019800" cy="5851525"/>
           </a:xfrm>
         </p:spPr>
@@ -638,7 +733,7 @@
           <a:p>
             <a:fld id="{2F5BB042-2B17-413A-8BB2-6FDBD0381532}" type="datetimeFigureOut">
               <a:rPr lang="en-US" smtClean="0"/>
-              <a:t>8/12/2012</a:t>
+              <a:t>10/10/2012</a:t>
             </a:fld>
             <a:endParaRPr lang="en-US"/>
           </a:p>
@@ -689,13 +784,32 @@
     </p:spTree>
     <p:extLst>
       <p:ext uri="{BB962C8B-B14F-4D97-AF65-F5344CB8AC3E}">
-        <p14:creationId xmlns:p14="http://schemas.microsoft.com/office/powerpoint/2010/main" val="3134201217"/>
+        <p14:creationId xmlns:p14="http://schemas.microsoft.com/office/powerpoint/2010/main" val="2969516489"/>
       </p:ext>
     </p:extLst>
   </p:cSld>
   <p:clrMapOvr>
     <a:masterClrMapping/>
   </p:clrMapOvr>
+  <mc:AlternateContent xmlns:mc="http://schemas.openxmlformats.org/markup-compatibility/2006" xmlns:p14="http://schemas.microsoft.com/office/powerpoint/2010/main">
+    <mc:Choice Requires="p14">
+      <p:transition p14:dur="60">
+        <p:fade/>
+      </p:transition>
+    </mc:Choice>
+    <mc:Fallback xmlns="">
+      <p:transition>
+        <p:fade/>
+      </p:transition>
+    </mc:Fallback>
+  </mc:AlternateContent>
+  <p:timing>
+    <p:tnLst>
+      <p:par>
+        <p:cTn id="1" dur="indefinite" restart="never" nodeType="tmRoot"/>
+      </p:par>
+    </p:tnLst>
+  </p:timing>
 </p:sldLayout>
 </file>
 
@@ -726,89 +840,154 @@
             <p:ph type="title"/>
           </p:nvPr>
         </p:nvSpPr>
+        <p:spPr>
+          <a:xfrm>
+            <a:off x="-76200" y="274639"/>
+            <a:ext cx="9296400" cy="1143000"/>
+          </a:xfrm>
+          <a:blipFill dpi="0" rotWithShape="1">
+            <a:blip r:embed="rId2"/>
+            <a:srcRect/>
+            <a:tile tx="0" ty="0" sx="100000" sy="100000" flip="none" algn="tl"/>
+          </a:blipFill>
+          <a:effectLst>
+            <a:glow rad="101600">
+              <a:srgbClr val="8A9AA1">
+                <a:alpha val="52000"/>
+              </a:srgbClr>
+            </a:glow>
+            <a:innerShdw blurRad="406400">
+              <a:prstClr val="black"/>
+            </a:innerShdw>
+          </a:effectLst>
+        </p:spPr>
+        <p:txBody>
+          <a:bodyPr vert="horz" lIns="91440" tIns="45720" rIns="91440" bIns="45720" rtlCol="0" anchor="ctr">
+            <a:noAutofit/>
+          </a:bodyPr>
+          <a:lstStyle>
+            <a:lvl1pPr>
+              <a:defRPr lang="en-US" sz="4400" b="0" strike="noStrike" cap="none" spc="-150" normalizeH="0" baseline="0">
+                <a:solidFill>
+                  <a:schemeClr val="bg1"/>
+                </a:solidFill>
+                <a:effectLst>
+                  <a:outerShdw blurRad="38100" dist="38100" dir="2700000" algn="tl">
+                    <a:srgbClr val="000000">
+                      <a:alpha val="43137"/>
+                    </a:srgbClr>
+                  </a:outerShdw>
+                </a:effectLst>
+                <a:latin typeface="HelveticaNeueLT Com 95 Blk" pitchFamily="34" charset="0"/>
+              </a:defRPr>
+            </a:lvl1pPr>
+          </a:lstStyle>
+          <a:p>
+            <a:pPr lvl="0"/>
+            <a:r>
+              <a:rPr lang="en-US" smtClean="0"/>
+              <a:t>Click to edit Master title style</a:t>
+            </a:r>
+            <a:endParaRPr lang="en-US" dirty="0"/>
+          </a:p>
+        </p:txBody>
+      </p:sp>
+      <p:sp>
+        <p:nvSpPr>
+          <p:cNvPr id="3" name="Content Placeholder 2"/>
+          <p:cNvSpPr>
+            <a:spLocks noGrp="1"/>
+          </p:cNvSpPr>
+          <p:nvPr>
+            <p:ph idx="1"/>
+          </p:nvPr>
+        </p:nvSpPr>
+        <p:spPr/>
+        <p:txBody>
+          <a:bodyPr/>
+          <a:lstStyle>
+            <a:lvl1pPr>
+              <a:defRPr>
+                <a:latin typeface="Helvetica LT Std Cond" pitchFamily="34" charset="0"/>
+              </a:defRPr>
+            </a:lvl1pPr>
+            <a:lvl2pPr>
+              <a:defRPr>
+                <a:latin typeface="Helvetica LT Std Cond" pitchFamily="34" charset="0"/>
+              </a:defRPr>
+            </a:lvl2pPr>
+            <a:lvl3pPr>
+              <a:defRPr>
+                <a:latin typeface="Helvetica LT Std Cond" pitchFamily="34" charset="0"/>
+              </a:defRPr>
+            </a:lvl3pPr>
+            <a:lvl4pPr>
+              <a:defRPr>
+                <a:latin typeface="Helvetica LT Std Cond" pitchFamily="34" charset="0"/>
+              </a:defRPr>
+            </a:lvl4pPr>
+            <a:lvl5pPr>
+              <a:defRPr>
+                <a:latin typeface="Helvetica LT Std Cond" pitchFamily="34" charset="0"/>
+              </a:defRPr>
+            </a:lvl5pPr>
+          </a:lstStyle>
+          <a:p>
+            <a:pPr lvl="0"/>
+            <a:r>
+              <a:rPr lang="en-US" smtClean="0"/>
+              <a:t>Click to edit Master text styles</a:t>
+            </a:r>
+          </a:p>
+          <a:p>
+            <a:pPr lvl="1"/>
+            <a:r>
+              <a:rPr lang="en-US" smtClean="0"/>
+              <a:t>Second level</a:t>
+            </a:r>
+          </a:p>
+          <a:p>
+            <a:pPr lvl="2"/>
+            <a:r>
+              <a:rPr lang="en-US" smtClean="0"/>
+              <a:t>Third level</a:t>
+            </a:r>
+          </a:p>
+          <a:p>
+            <a:pPr lvl="3"/>
+            <a:r>
+              <a:rPr lang="en-US" smtClean="0"/>
+              <a:t>Fourth level</a:t>
+            </a:r>
+          </a:p>
+          <a:p>
+            <a:pPr lvl="4"/>
+            <a:r>
+              <a:rPr lang="en-US" smtClean="0"/>
+              <a:t>Fifth level</a:t>
+            </a:r>
+            <a:endParaRPr lang="en-US"/>
+          </a:p>
+        </p:txBody>
+      </p:sp>
+      <p:sp>
+        <p:nvSpPr>
+          <p:cNvPr id="4" name="Date Placeholder 3"/>
+          <p:cNvSpPr>
+            <a:spLocks noGrp="1"/>
+          </p:cNvSpPr>
+          <p:nvPr>
+            <p:ph type="dt" sz="half" idx="10"/>
+          </p:nvPr>
+        </p:nvSpPr>
         <p:spPr/>
         <p:txBody>
           <a:bodyPr/>
           <a:lstStyle/>
           <a:p>
-            <a:r>
-              <a:rPr lang="en-US" smtClean="0"/>
-              <a:t>Click to edit Master title style</a:t>
-            </a:r>
-            <a:endParaRPr lang="en-US"/>
-          </a:p>
-        </p:txBody>
-      </p:sp>
-      <p:sp>
-        <p:nvSpPr>
-          <p:cNvPr id="3" name="Content Placeholder 2"/>
-          <p:cNvSpPr>
-            <a:spLocks noGrp="1"/>
-          </p:cNvSpPr>
-          <p:nvPr>
-            <p:ph idx="1"/>
-          </p:nvPr>
-        </p:nvSpPr>
-        <p:spPr/>
-        <p:txBody>
-          <a:bodyPr/>
-          <a:lstStyle/>
-          <a:p>
-            <a:pPr lvl="0"/>
-            <a:r>
-              <a:rPr lang="en-US" smtClean="0"/>
-              <a:t>Click to edit Master text styles</a:t>
-            </a:r>
-          </a:p>
-          <a:p>
-            <a:pPr lvl="1"/>
-            <a:r>
-              <a:rPr lang="en-US" smtClean="0"/>
-              <a:t>Second level</a:t>
-            </a:r>
-          </a:p>
-          <a:p>
-            <a:pPr lvl="2"/>
-            <a:r>
-              <a:rPr lang="en-US" smtClean="0"/>
-              <a:t>Third level</a:t>
-            </a:r>
-          </a:p>
-          <a:p>
-            <a:pPr lvl="3"/>
-            <a:r>
-              <a:rPr lang="en-US" smtClean="0"/>
-              <a:t>Fourth level</a:t>
-            </a:r>
-          </a:p>
-          <a:p>
-            <a:pPr lvl="4"/>
-            <a:r>
-              <a:rPr lang="en-US" smtClean="0"/>
-              <a:t>Fifth level</a:t>
-            </a:r>
-            <a:endParaRPr lang="en-US"/>
-          </a:p>
-        </p:txBody>
-      </p:sp>
-      <p:sp>
-        <p:nvSpPr>
-          <p:cNvPr id="4" name="Date Placeholder 3"/>
-          <p:cNvSpPr>
-            <a:spLocks noGrp="1"/>
-          </p:cNvSpPr>
-          <p:nvPr>
-            <p:ph type="dt" sz="half" idx="10"/>
-          </p:nvPr>
-        </p:nvSpPr>
-        <p:spPr/>
-        <p:txBody>
-          <a:bodyPr/>
-          <a:lstStyle/>
-          <a:p>
             <a:fld id="{2F5BB042-2B17-413A-8BB2-6FDBD0381532}" type="datetimeFigureOut">
               <a:rPr lang="en-US" smtClean="0"/>
-              <a:t>8/12/2012</a:t>
+              <a:t>10/10/2012</a:t>
             </a:fld>
             <a:endParaRPr lang="en-US"/>
           </a:p>
@@ -859,13 +1038,32 @@
     </p:spTree>
     <p:extLst>
       <p:ext uri="{BB962C8B-B14F-4D97-AF65-F5344CB8AC3E}">
-        <p14:creationId xmlns:p14="http://schemas.microsoft.com/office/powerpoint/2010/main" val="1899131203"/>
+        <p14:creationId xmlns:p14="http://schemas.microsoft.com/office/powerpoint/2010/main" val="2308842273"/>
       </p:ext>
     </p:extLst>
   </p:cSld>
   <p:clrMapOvr>
     <a:masterClrMapping/>
   </p:clrMapOvr>
+  <mc:AlternateContent xmlns:mc="http://schemas.openxmlformats.org/markup-compatibility/2006" xmlns:p14="http://schemas.microsoft.com/office/powerpoint/2010/main">
+    <mc:Choice Requires="p14">
+      <p:transition p14:dur="60">
+        <p:fade/>
+      </p:transition>
+    </mc:Choice>
+    <mc:Fallback xmlns="">
+      <p:transition>
+        <p:fade/>
+      </p:transition>
+    </mc:Fallback>
+  </mc:AlternateContent>
+  <p:timing>
+    <p:tnLst>
+      <p:par>
+        <p:cTn id="1" dur="indefinite" restart="never" nodeType="tmRoot"/>
+      </p:par>
+    </p:tnLst>
+  </p:timing>
 </p:sldLayout>
 </file>
 
@@ -898,7 +1096,7 @@
         </p:nvSpPr>
         <p:spPr>
           <a:xfrm>
-            <a:off x="722313" y="4406900"/>
+            <a:off x="722313" y="4406901"/>
             <a:ext cx="7772400" cy="1362075"/>
           </a:xfrm>
         </p:spPr>
@@ -1054,7 +1252,7 @@
           <a:p>
             <a:fld id="{2F5BB042-2B17-413A-8BB2-6FDBD0381532}" type="datetimeFigureOut">
               <a:rPr lang="en-US" smtClean="0"/>
-              <a:t>8/12/2012</a:t>
+              <a:t>10/10/2012</a:t>
             </a:fld>
             <a:endParaRPr lang="en-US"/>
           </a:p>
@@ -1105,13 +1303,32 @@
     </p:spTree>
     <p:extLst>
       <p:ext uri="{BB962C8B-B14F-4D97-AF65-F5344CB8AC3E}">
-        <p14:creationId xmlns:p14="http://schemas.microsoft.com/office/powerpoint/2010/main" val="1407680095"/>
+        <p14:creationId xmlns:p14="http://schemas.microsoft.com/office/powerpoint/2010/main" val="434113752"/>
       </p:ext>
     </p:extLst>
   </p:cSld>
   <p:clrMapOvr>
     <a:masterClrMapping/>
   </p:clrMapOvr>
+  <mc:AlternateContent xmlns:mc="http://schemas.openxmlformats.org/markup-compatibility/2006" xmlns:p14="http://schemas.microsoft.com/office/powerpoint/2010/main">
+    <mc:Choice Requires="p14">
+      <p:transition p14:dur="60">
+        <p:fade/>
+      </p:transition>
+    </mc:Choice>
+    <mc:Fallback xmlns="">
+      <p:transition>
+        <p:fade/>
+      </p:transition>
+    </mc:Fallback>
+  </mc:AlternateContent>
+  <p:timing>
+    <p:tnLst>
+      <p:par>
+        <p:cTn id="1" dur="indefinite" restart="never" nodeType="tmRoot"/>
+      </p:par>
+    </p:tnLst>
+  </p:timing>
 </p:sldLayout>
 </file>
 
@@ -1167,7 +1384,7 @@
         </p:nvSpPr>
         <p:spPr>
           <a:xfrm>
-            <a:off x="457200" y="1600200"/>
+            <a:off x="457200" y="1600201"/>
             <a:ext cx="4038600" cy="4525963"/>
           </a:xfrm>
         </p:spPr>
@@ -1252,7 +1469,7 @@
         </p:nvSpPr>
         <p:spPr>
           <a:xfrm>
-            <a:off x="4648200" y="1600200"/>
+            <a:off x="4648200" y="1600201"/>
             <a:ext cx="4038600" cy="4525963"/>
           </a:xfrm>
         </p:spPr>
@@ -1342,7 +1559,7 @@
           <a:p>
             <a:fld id="{2F5BB042-2B17-413A-8BB2-6FDBD0381532}" type="datetimeFigureOut">
               <a:rPr lang="en-US" smtClean="0"/>
-              <a:t>8/12/2012</a:t>
+              <a:t>10/10/2012</a:t>
             </a:fld>
             <a:endParaRPr lang="en-US"/>
           </a:p>
@@ -1393,13 +1610,32 @@
     </p:spTree>
     <p:extLst>
       <p:ext uri="{BB962C8B-B14F-4D97-AF65-F5344CB8AC3E}">
-        <p14:creationId xmlns:p14="http://schemas.microsoft.com/office/powerpoint/2010/main" val="916872258"/>
+        <p14:creationId xmlns:p14="http://schemas.microsoft.com/office/powerpoint/2010/main" val="1680843911"/>
       </p:ext>
     </p:extLst>
   </p:cSld>
   <p:clrMapOvr>
     <a:masterClrMapping/>
   </p:clrMapOvr>
+  <mc:AlternateContent xmlns:mc="http://schemas.openxmlformats.org/markup-compatibility/2006" xmlns:p14="http://schemas.microsoft.com/office/powerpoint/2010/main">
+    <mc:Choice Requires="p14">
+      <p:transition p14:dur="60">
+        <p:fade/>
+      </p:transition>
+    </mc:Choice>
+    <mc:Fallback xmlns="">
+      <p:transition>
+        <p:fade/>
+      </p:transition>
+    </mc:Fallback>
+  </mc:AlternateContent>
+  <p:timing>
+    <p:tnLst>
+      <p:par>
+        <p:cTn id="1" dur="indefinite" restart="never" nodeType="tmRoot"/>
+      </p:par>
+    </p:tnLst>
+  </p:timing>
 </p:sldLayout>
 </file>
 
@@ -1460,7 +1696,7 @@
         <p:spPr>
           <a:xfrm>
             <a:off x="457200" y="1535113"/>
-            <a:ext cx="4040188" cy="639762"/>
+            <a:ext cx="4040188" cy="639763"/>
           </a:xfrm>
         </p:spPr>
         <p:txBody>
@@ -1609,8 +1845,8 @@
         </p:nvSpPr>
         <p:spPr>
           <a:xfrm>
-            <a:off x="4645025" y="1535113"/>
-            <a:ext cx="4041775" cy="639762"/>
+            <a:off x="4645027" y="1535113"/>
+            <a:ext cx="4041775" cy="639763"/>
           </a:xfrm>
         </p:spPr>
         <p:txBody>
@@ -1674,7 +1910,7 @@
         </p:nvSpPr>
         <p:spPr>
           <a:xfrm>
-            <a:off x="4645025" y="2174875"/>
+            <a:off x="4645027" y="2174875"/>
             <a:ext cx="4041775" cy="3951288"/>
           </a:xfrm>
         </p:spPr>
@@ -1764,7 +2000,7 @@
           <a:p>
             <a:fld id="{2F5BB042-2B17-413A-8BB2-6FDBD0381532}" type="datetimeFigureOut">
               <a:rPr lang="en-US" smtClean="0"/>
-              <a:t>8/12/2012</a:t>
+              <a:t>10/10/2012</a:t>
             </a:fld>
             <a:endParaRPr lang="en-US"/>
           </a:p>
@@ -1815,13 +2051,25 @@
     </p:spTree>
     <p:extLst>
       <p:ext uri="{BB962C8B-B14F-4D97-AF65-F5344CB8AC3E}">
-        <p14:creationId xmlns:p14="http://schemas.microsoft.com/office/powerpoint/2010/main" val="1877045277"/>
+        <p14:creationId xmlns:p14="http://schemas.microsoft.com/office/powerpoint/2010/main" val="248300969"/>
       </p:ext>
     </p:extLst>
   </p:cSld>
   <p:clrMapOvr>
     <a:masterClrMapping/>
   </p:clrMapOvr>
+  <mc:AlternateContent xmlns:mc="http://schemas.openxmlformats.org/markup-compatibility/2006" xmlns:p14="http://schemas.microsoft.com/office/powerpoint/2010/main">
+    <mc:Choice Requires="p14">
+      <p:transition p14:dur="60">
+        <p:fade/>
+      </p:transition>
+    </mc:Choice>
+    <mc:Fallback xmlns="">
+      <p:transition>
+        <p:fade/>
+      </p:transition>
+    </mc:Fallback>
+  </mc:AlternateContent>
 </p:sldLayout>
 </file>
 
@@ -1852,94 +2100,88 @@
             <p:ph type="title"/>
           </p:nvPr>
         </p:nvSpPr>
-        <p:spPr/>
-        <p:txBody>
-          <a:bodyPr/>
-          <a:lstStyle/>
+        <p:spPr>
+          <a:xfrm>
+            <a:off x="-76200" y="274637"/>
+            <a:ext cx="9296400" cy="6278563"/>
+          </a:xfrm>
+          <a:blipFill dpi="0" rotWithShape="1">
+            <a:blip r:embed="rId2"/>
+            <a:srcRect/>
+            <a:tile tx="0" ty="0" sx="100000" sy="100000" flip="none" algn="tl"/>
+          </a:blipFill>
+          <a:effectLst>
+            <a:glow rad="101600">
+              <a:srgbClr val="8A9AA1">
+                <a:alpha val="52000"/>
+              </a:srgbClr>
+            </a:glow>
+            <a:innerShdw blurRad="1219200">
+              <a:prstClr val="black"/>
+            </a:innerShdw>
+          </a:effectLst>
+        </p:spPr>
+        <p:txBody>
+          <a:bodyPr>
+            <a:normAutofit/>
+          </a:bodyPr>
+          <a:lstStyle>
+            <a:lvl1pPr>
+              <a:defRPr lang="en-US" sz="11200" b="0" strike="noStrike" kern="1200" cap="none" spc="-400" normalizeH="0" baseline="0" dirty="0">
+                <a:solidFill>
+                  <a:schemeClr val="bg1"/>
+                </a:solidFill>
+                <a:effectLst>
+                  <a:outerShdw blurRad="38100" dist="38100" dir="2700000" algn="tl">
+                    <a:srgbClr val="000000">
+                      <a:alpha val="43137"/>
+                    </a:srgbClr>
+                  </a:outerShdw>
+                </a:effectLst>
+                <a:latin typeface="HelveticaNeueLT Com 95 Blk" pitchFamily="34" charset="0"/>
+                <a:ea typeface="+mj-ea"/>
+                <a:cs typeface="+mj-cs"/>
+              </a:defRPr>
+            </a:lvl1pPr>
+          </a:lstStyle>
           <a:p>
             <a:r>
               <a:rPr lang="en-US" smtClean="0"/>
               <a:t>Click to edit Master title style</a:t>
             </a:r>
-            <a:endParaRPr lang="en-US"/>
-          </a:p>
-        </p:txBody>
-      </p:sp>
-      <p:sp>
-        <p:nvSpPr>
-          <p:cNvPr id="3" name="Date Placeholder 2"/>
-          <p:cNvSpPr>
-            <a:spLocks noGrp="1"/>
-          </p:cNvSpPr>
-          <p:nvPr>
-            <p:ph type="dt" sz="half" idx="10"/>
-          </p:nvPr>
-        </p:nvSpPr>
-        <p:spPr/>
-        <p:txBody>
-          <a:bodyPr/>
-          <a:lstStyle/>
-          <a:p>
-            <a:fld id="{2F5BB042-2B17-413A-8BB2-6FDBD0381532}" type="datetimeFigureOut">
-              <a:rPr lang="en-US" smtClean="0"/>
-              <a:t>8/12/2012</a:t>
-            </a:fld>
-            <a:endParaRPr lang="en-US"/>
-          </a:p>
-        </p:txBody>
-      </p:sp>
-      <p:sp>
-        <p:nvSpPr>
-          <p:cNvPr id="4" name="Footer Placeholder 3"/>
-          <p:cNvSpPr>
-            <a:spLocks noGrp="1"/>
-          </p:cNvSpPr>
-          <p:nvPr>
-            <p:ph type="ftr" sz="quarter" idx="11"/>
-          </p:nvPr>
-        </p:nvSpPr>
-        <p:spPr/>
-        <p:txBody>
-          <a:bodyPr/>
-          <a:lstStyle/>
-          <a:p>
-            <a:endParaRPr lang="en-US"/>
-          </a:p>
-        </p:txBody>
-      </p:sp>
-      <p:sp>
-        <p:nvSpPr>
-          <p:cNvPr id="5" name="Slide Number Placeholder 4"/>
-          <p:cNvSpPr>
-            <a:spLocks noGrp="1"/>
-          </p:cNvSpPr>
-          <p:nvPr>
-            <p:ph type="sldNum" sz="quarter" idx="12"/>
-          </p:nvPr>
-        </p:nvSpPr>
-        <p:spPr/>
-        <p:txBody>
-          <a:bodyPr/>
-          <a:lstStyle/>
-          <a:p>
-            <a:fld id="{F130C7C2-E2F1-465B-8C07-FB00D7F0D149}" type="slidenum">
-              <a:rPr lang="en-US" smtClean="0"/>
-              <a:t>‹#›</a:t>
-            </a:fld>
-            <a:endParaRPr lang="en-US"/>
+            <a:endParaRPr lang="en-US" dirty="0"/>
           </a:p>
         </p:txBody>
       </p:sp>
     </p:spTree>
     <p:extLst>
       <p:ext uri="{BB962C8B-B14F-4D97-AF65-F5344CB8AC3E}">
-        <p14:creationId xmlns:p14="http://schemas.microsoft.com/office/powerpoint/2010/main" val="1415080509"/>
+        <p14:creationId xmlns:p14="http://schemas.microsoft.com/office/powerpoint/2010/main" val="54480764"/>
       </p:ext>
     </p:extLst>
   </p:cSld>
   <p:clrMapOvr>
     <a:masterClrMapping/>
   </p:clrMapOvr>
+  <mc:AlternateContent xmlns:mc="http://schemas.openxmlformats.org/markup-compatibility/2006" xmlns:p14="http://schemas.microsoft.com/office/powerpoint/2010/main">
+    <mc:Choice Requires="p14">
+      <p:transition p14:dur="60">
+        <p:fade/>
+      </p:transition>
+    </mc:Choice>
+    <mc:Fallback xmlns="">
+      <p:transition>
+        <p:fade/>
+      </p:transition>
+    </mc:Fallback>
+  </mc:AlternateContent>
+  <p:timing>
+    <p:tnLst>
+      <p:par>
+        <p:cTn id="1" dur="indefinite" restart="never" nodeType="tmRoot"/>
+      </p:par>
+    </p:tnLst>
+  </p:timing>
 </p:sldLayout>
 </file>
 
@@ -1977,7 +2219,7 @@
           <a:p>
             <a:fld id="{2F5BB042-2B17-413A-8BB2-6FDBD0381532}" type="datetimeFigureOut">
               <a:rPr lang="en-US" smtClean="0"/>
-              <a:t>8/12/2012</a:t>
+              <a:t>10/10/2012</a:t>
             </a:fld>
             <a:endParaRPr lang="en-US"/>
           </a:p>
@@ -2028,13 +2270,25 @@
     </p:spTree>
     <p:extLst>
       <p:ext uri="{BB962C8B-B14F-4D97-AF65-F5344CB8AC3E}">
-        <p14:creationId xmlns:p14="http://schemas.microsoft.com/office/powerpoint/2010/main" val="2323904381"/>
+        <p14:creationId xmlns:p14="http://schemas.microsoft.com/office/powerpoint/2010/main" val="3334397594"/>
       </p:ext>
     </p:extLst>
   </p:cSld>
   <p:clrMapOvr>
     <a:masterClrMapping/>
   </p:clrMapOvr>
+  <mc:AlternateContent xmlns:mc="http://schemas.openxmlformats.org/markup-compatibility/2006" xmlns:p14="http://schemas.microsoft.com/office/powerpoint/2010/main">
+    <mc:Choice Requires="p14">
+      <p:transition p14:dur="60">
+        <p:fade/>
+      </p:transition>
+    </mc:Choice>
+    <mc:Fallback xmlns="">
+      <p:transition>
+        <p:fade/>
+      </p:transition>
+    </mc:Fallback>
+  </mc:AlternateContent>
 </p:sldLayout>
 </file>
 
@@ -2067,8 +2321,8 @@
         </p:nvSpPr>
         <p:spPr>
           <a:xfrm>
-            <a:off x="457200" y="273050"/>
-            <a:ext cx="3008313" cy="1162050"/>
+            <a:off x="457202" y="273049"/>
+            <a:ext cx="3008313" cy="1162051"/>
           </a:xfrm>
         </p:spPr>
         <p:txBody>
@@ -2099,7 +2353,7 @@
         </p:nvSpPr>
         <p:spPr>
           <a:xfrm>
-            <a:off x="3575050" y="273050"/>
+            <a:off x="3575050" y="273052"/>
             <a:ext cx="5111750" cy="5853113"/>
           </a:xfrm>
         </p:spPr>
@@ -2184,7 +2438,7 @@
         </p:nvSpPr>
         <p:spPr>
           <a:xfrm>
-            <a:off x="457200" y="1435100"/>
+            <a:off x="457202" y="1435102"/>
             <a:ext cx="3008313" cy="4691063"/>
           </a:xfrm>
         </p:spPr>
@@ -2254,7 +2508,7 @@
           <a:p>
             <a:fld id="{2F5BB042-2B17-413A-8BB2-6FDBD0381532}" type="datetimeFigureOut">
               <a:rPr lang="en-US" smtClean="0"/>
-              <a:t>8/12/2012</a:t>
+              <a:t>10/10/2012</a:t>
             </a:fld>
             <a:endParaRPr lang="en-US"/>
           </a:p>
@@ -2305,18 +2559,30 @@
     </p:spTree>
     <p:extLst>
       <p:ext uri="{BB962C8B-B14F-4D97-AF65-F5344CB8AC3E}">
-        <p14:creationId xmlns:p14="http://schemas.microsoft.com/office/powerpoint/2010/main" val="2236407361"/>
+        <p14:creationId xmlns:p14="http://schemas.microsoft.com/office/powerpoint/2010/main" val="3800883126"/>
       </p:ext>
     </p:extLst>
   </p:cSld>
   <p:clrMapOvr>
     <a:masterClrMapping/>
   </p:clrMapOvr>
+  <mc:AlternateContent xmlns:mc="http://schemas.openxmlformats.org/markup-compatibility/2006" xmlns:p14="http://schemas.microsoft.com/office/powerpoint/2010/main">
+    <mc:Choice Requires="p14">
+      <p:transition p14:dur="60">
+        <p:fade/>
+      </p:transition>
+    </mc:Choice>
+    <mc:Fallback xmlns="">
+      <p:transition>
+        <p:fade/>
+      </p:transition>
+    </mc:Fallback>
+  </mc:AlternateContent>
 </p:sldLayout>
 </file>
 
 <file path=ppt/slideLayouts/slideLayout9.xml><?xml version="1.0" encoding="utf-8"?>
-<p:sldLayout xmlns:a="http://schemas.openxmlformats.org/drawingml/2006/main" xmlns:r="http://schemas.openxmlformats.org/officeDocument/2006/relationships" xmlns:p="http://schemas.openxmlformats.org/presentationml/2006/main" type="picTx" preserve="1">
+<p:sldLayout xmlns:a="http://schemas.openxmlformats.org/drawingml/2006/main" xmlns:r="http://schemas.openxmlformats.org/officeDocument/2006/relationships" xmlns:p="http://schemas.openxmlformats.org/presentationml/2006/main" preserve="1">
   <p:cSld name="Picture with Caption">
     <p:spTree>
       <p:nvGrpSpPr>
@@ -2344,23 +2610,53 @@
         </p:nvSpPr>
         <p:spPr>
           <a:xfrm>
-            <a:off x="1792288" y="4800600"/>
-            <a:ext cx="5486400" cy="566738"/>
+            <a:off x="-76200" y="5715000"/>
+            <a:ext cx="9296400" cy="914400"/>
           </a:xfrm>
+          <a:blipFill dpi="0" rotWithShape="1">
+            <a:blip r:embed="rId2"/>
+            <a:srcRect/>
+            <a:tile tx="0" ty="0" sx="100000" sy="100000" flip="none" algn="tl"/>
+          </a:blipFill>
+          <a:effectLst>
+            <a:glow rad="101600">
+              <a:srgbClr val="8A9AA1">
+                <a:alpha val="52000"/>
+              </a:srgbClr>
+            </a:glow>
+            <a:innerShdw blurRad="406400">
+              <a:prstClr val="black"/>
+            </a:innerShdw>
+          </a:effectLst>
         </p:spPr>
         <p:txBody>
-          <a:bodyPr anchor="b"/>
+          <a:bodyPr vert="horz" lIns="91440" tIns="45720" rIns="91440" bIns="45720" rtlCol="0" anchor="ctr">
+            <a:noAutofit/>
+          </a:bodyPr>
           <a:lstStyle>
-            <a:lvl1pPr algn="l">
-              <a:defRPr sz="2000" b="1"/>
+            <a:lvl1pPr>
+              <a:defRPr lang="en-US" b="0" strike="noStrike" cap="none" spc="-150" normalizeH="0" baseline="0">
+                <a:solidFill>
+                  <a:schemeClr val="bg1"/>
+                </a:solidFill>
+                <a:effectLst>
+                  <a:outerShdw blurRad="38100" dist="38100" dir="2700000" algn="tl">
+                    <a:srgbClr val="000000">
+                      <a:alpha val="43137"/>
+                    </a:srgbClr>
+                  </a:outerShdw>
+                </a:effectLst>
+                <a:latin typeface="HelveticaNeueLT Com 95 Blk" pitchFamily="34" charset="0"/>
+              </a:defRPr>
             </a:lvl1pPr>
           </a:lstStyle>
           <a:p>
+            <a:pPr lvl="0"/>
             <a:r>
               <a:rPr lang="en-US" smtClean="0"/>
               <a:t>Click to edit Master title style</a:t>
             </a:r>
-            <a:endParaRPr lang="en-US"/>
+            <a:endParaRPr lang="en-US" dirty="0"/>
           </a:p>
         </p:txBody>
       </p:sp>
@@ -2368,7 +2664,7 @@
         <p:nvSpPr>
           <p:cNvPr id="3" name="Picture Placeholder 2"/>
           <p:cNvSpPr>
-            <a:spLocks noGrp="1"/>
+            <a:spLocks noGrp="1" noChangeAspect="1"/>
           </p:cNvSpPr>
           <p:nvPr>
             <p:ph type="pic" idx="1"/>
@@ -2376,9 +2672,16 @@
         </p:nvSpPr>
         <p:spPr>
           <a:xfrm>
-            <a:off x="1792288" y="612775"/>
-            <a:ext cx="5486400" cy="4114800"/>
+            <a:off x="914400" y="228600"/>
+            <a:ext cx="7315200" cy="5257800"/>
           </a:xfrm>
+          <a:effectLst>
+            <a:glow rad="101600">
+              <a:srgbClr val="8A9AA1">
+                <a:alpha val="36000"/>
+              </a:srgbClr>
+            </a:glow>
+          </a:effectLst>
         </p:spPr>
         <p:txBody>
           <a:bodyPr/>
@@ -2421,150 +2724,43 @@
             </a:lvl9pPr>
           </a:lstStyle>
           <a:p>
-            <a:endParaRPr lang="en-US"/>
-          </a:p>
-        </p:txBody>
-      </p:sp>
-      <p:sp>
-        <p:nvSpPr>
-          <p:cNvPr id="4" name="Text Placeholder 3"/>
-          <p:cNvSpPr>
-            <a:spLocks noGrp="1"/>
-          </p:cNvSpPr>
-          <p:nvPr>
-            <p:ph type="body" sz="half" idx="2"/>
-          </p:nvPr>
-        </p:nvSpPr>
-        <p:spPr>
-          <a:xfrm>
-            <a:off x="1792288" y="5367338"/>
-            <a:ext cx="5486400" cy="804862"/>
-          </a:xfrm>
-        </p:spPr>
-        <p:txBody>
-          <a:bodyPr/>
-          <a:lstStyle>
-            <a:lvl1pPr marL="0" indent="0">
-              <a:buNone/>
-              <a:defRPr sz="1400"/>
-            </a:lvl1pPr>
-            <a:lvl2pPr marL="457200" indent="0">
-              <a:buNone/>
-              <a:defRPr sz="1200"/>
-            </a:lvl2pPr>
-            <a:lvl3pPr marL="914400" indent="0">
-              <a:buNone/>
-              <a:defRPr sz="1000"/>
-            </a:lvl3pPr>
-            <a:lvl4pPr marL="1371600" indent="0">
-              <a:buNone/>
-              <a:defRPr sz="900"/>
-            </a:lvl4pPr>
-            <a:lvl5pPr marL="1828800" indent="0">
-              <a:buNone/>
-              <a:defRPr sz="900"/>
-            </a:lvl5pPr>
-            <a:lvl6pPr marL="2286000" indent="0">
-              <a:buNone/>
-              <a:defRPr sz="900"/>
-            </a:lvl6pPr>
-            <a:lvl7pPr marL="2743200" indent="0">
-              <a:buNone/>
-              <a:defRPr sz="900"/>
-            </a:lvl7pPr>
-            <a:lvl8pPr marL="3200400" indent="0">
-              <a:buNone/>
-              <a:defRPr sz="900"/>
-            </a:lvl8pPr>
-            <a:lvl9pPr marL="3657600" indent="0">
-              <a:buNone/>
-              <a:defRPr sz="900"/>
-            </a:lvl9pPr>
-          </a:lstStyle>
-          <a:p>
-            <a:pPr lvl="0"/>
-            <a:r>
-              <a:rPr lang="en-US" smtClean="0"/>
-              <a:t>Click to edit Master text styles</a:t>
-            </a:r>
-          </a:p>
-        </p:txBody>
-      </p:sp>
-      <p:sp>
-        <p:nvSpPr>
-          <p:cNvPr id="5" name="Date Placeholder 4"/>
-          <p:cNvSpPr>
-            <a:spLocks noGrp="1"/>
-          </p:cNvSpPr>
-          <p:nvPr>
-            <p:ph type="dt" sz="half" idx="10"/>
-          </p:nvPr>
-        </p:nvSpPr>
-        <p:spPr/>
-        <p:txBody>
-          <a:bodyPr/>
-          <a:lstStyle/>
-          <a:p>
-            <a:fld id="{2F5BB042-2B17-413A-8BB2-6FDBD0381532}" type="datetimeFigureOut">
-              <a:rPr lang="en-US" smtClean="0"/>
-              <a:t>8/12/2012</a:t>
-            </a:fld>
-            <a:endParaRPr lang="en-US"/>
-          </a:p>
-        </p:txBody>
-      </p:sp>
-      <p:sp>
-        <p:nvSpPr>
-          <p:cNvPr id="6" name="Footer Placeholder 5"/>
-          <p:cNvSpPr>
-            <a:spLocks noGrp="1"/>
-          </p:cNvSpPr>
-          <p:nvPr>
-            <p:ph type="ftr" sz="quarter" idx="11"/>
-          </p:nvPr>
-        </p:nvSpPr>
-        <p:spPr/>
-        <p:txBody>
-          <a:bodyPr/>
-          <a:lstStyle/>
-          <a:p>
-            <a:endParaRPr lang="en-US"/>
-          </a:p>
-        </p:txBody>
-      </p:sp>
-      <p:sp>
-        <p:nvSpPr>
-          <p:cNvPr id="7" name="Slide Number Placeholder 6"/>
-          <p:cNvSpPr>
-            <a:spLocks noGrp="1"/>
-          </p:cNvSpPr>
-          <p:nvPr>
-            <p:ph type="sldNum" sz="quarter" idx="12"/>
-          </p:nvPr>
-        </p:nvSpPr>
-        <p:spPr/>
-        <p:txBody>
-          <a:bodyPr/>
-          <a:lstStyle/>
-          <a:p>
-            <a:fld id="{F130C7C2-E2F1-465B-8C07-FB00D7F0D149}" type="slidenum">
-              <a:rPr lang="en-US" smtClean="0"/>
-              <a:t>‹#›</a:t>
-            </a:fld>
-            <a:endParaRPr lang="en-US"/>
+            <a:r>
+              <a:rPr lang="en-US" smtClean="0"/>
+              <a:t>Click icon to add picture</a:t>
+            </a:r>
+            <a:endParaRPr lang="en-US" dirty="0"/>
           </a:p>
         </p:txBody>
       </p:sp>
     </p:spTree>
     <p:extLst>
       <p:ext uri="{BB962C8B-B14F-4D97-AF65-F5344CB8AC3E}">
-        <p14:creationId xmlns:p14="http://schemas.microsoft.com/office/powerpoint/2010/main" val="3681062011"/>
+        <p14:creationId xmlns:p14="http://schemas.microsoft.com/office/powerpoint/2010/main" val="2329548478"/>
       </p:ext>
     </p:extLst>
   </p:cSld>
   <p:clrMapOvr>
     <a:masterClrMapping/>
   </p:clrMapOvr>
+  <mc:AlternateContent xmlns:mc="http://schemas.openxmlformats.org/markup-compatibility/2006" xmlns:p14="http://schemas.microsoft.com/office/powerpoint/2010/main">
+    <mc:Choice Requires="p14">
+      <p:transition p14:dur="60">
+        <p:fade/>
+      </p:transition>
+    </mc:Choice>
+    <mc:Fallback xmlns="">
+      <p:transition>
+        <p:fade/>
+      </p:transition>
+    </mc:Fallback>
+  </mc:AlternateContent>
+  <p:timing>
+    <p:tnLst>
+      <p:par>
+        <p:cTn id="1" dur="indefinite" restart="never" nodeType="tmRoot"/>
+      </p:par>
+    </p:tnLst>
+  </p:timing>
 </p:sldLayout>
 </file>
 
@@ -2572,9 +2768,16 @@
 <p:sldMaster xmlns:a="http://schemas.openxmlformats.org/drawingml/2006/main" xmlns:r="http://schemas.openxmlformats.org/officeDocument/2006/relationships" xmlns:p="http://schemas.openxmlformats.org/presentationml/2006/main">
   <p:cSld>
     <p:bg>
-      <p:bgRef idx="1001">
-        <a:schemeClr val="bg1"/>
-      </p:bgRef>
+      <p:bgPr>
+        <a:blipFill dpi="0" rotWithShape="1">
+          <a:blip r:embed="rId13">
+            <a:lum/>
+          </a:blip>
+          <a:srcRect/>
+          <a:tile tx="0" ty="0" sx="100000" sy="100000" flip="none" algn="tl"/>
+        </a:blipFill>
+        <a:effectLst/>
+      </p:bgPr>
     </p:bg>
     <p:spTree>
       <p:nvGrpSpPr>
@@ -2602,47 +2805,62 @@
         </p:nvSpPr>
         <p:spPr>
           <a:xfrm>
-            <a:off x="457200" y="274638"/>
-            <a:ext cx="8229600" cy="1143000"/>
+            <a:off x="-76200" y="274639"/>
+            <a:ext cx="9296400" cy="1143000"/>
+          </a:xfrm>
+          <a:prstGeom prst="rect">
+            <a:avLst/>
+          </a:prstGeom>
+          <a:blipFill dpi="0" rotWithShape="1">
+            <a:blip r:embed="rId14"/>
+            <a:srcRect/>
+            <a:tile tx="0" ty="0" sx="100000" sy="100000" flip="none" algn="tl"/>
+          </a:blipFill>
+          <a:effectLst>
+            <a:glow rad="101600">
+              <a:srgbClr val="8A9AA1">
+                <a:alpha val="52000"/>
+              </a:srgbClr>
+            </a:glow>
+            <a:innerShdw blurRad="406400">
+              <a:prstClr val="black"/>
+            </a:innerShdw>
+          </a:effectLst>
+        </p:spPr>
+        <p:txBody>
+          <a:bodyPr vert="horz" lIns="91440" tIns="45720" rIns="91440" bIns="45720" rtlCol="0" anchor="ctr">
+            <a:normAutofit/>
+          </a:bodyPr>
+          <a:lstStyle/>
+          <a:p>
+            <a:r>
+              <a:rPr lang="en-US" smtClean="0"/>
+              <a:t>Click to edit Master title style</a:t>
+            </a:r>
+            <a:endParaRPr lang="en-US" dirty="0"/>
+          </a:p>
+        </p:txBody>
+      </p:sp>
+      <p:sp>
+        <p:nvSpPr>
+          <p:cNvPr id="3" name="Text Placeholder 2"/>
+          <p:cNvSpPr>
+            <a:spLocks noGrp="1"/>
+          </p:cNvSpPr>
+          <p:nvPr>
+            <p:ph type="body" idx="1"/>
+          </p:nvPr>
+        </p:nvSpPr>
+        <p:spPr>
+          <a:xfrm>
+            <a:off x="457200" y="1600200"/>
+            <a:ext cx="8229600" cy="4648200"/>
           </a:xfrm>
           <a:prstGeom prst="rect">
             <a:avLst/>
           </a:prstGeom>
         </p:spPr>
         <p:txBody>
-          <a:bodyPr vert="horz" lIns="91440" tIns="45720" rIns="91440" bIns="45720" rtlCol="0" anchor="ctr">
-            <a:normAutofit/>
-          </a:bodyPr>
-          <a:lstStyle/>
-          <a:p>
-            <a:r>
-              <a:rPr lang="en-US" smtClean="0"/>
-              <a:t>Click to edit Master title style</a:t>
-            </a:r>
-            <a:endParaRPr lang="en-US"/>
-          </a:p>
-        </p:txBody>
-      </p:sp>
-      <p:sp>
-        <p:nvSpPr>
-          <p:cNvPr id="3" name="Text Placeholder 2"/>
-          <p:cNvSpPr>
-            <a:spLocks noGrp="1"/>
-          </p:cNvSpPr>
-          <p:nvPr>
-            <p:ph type="body" idx="1"/>
-          </p:nvPr>
-        </p:nvSpPr>
-        <p:spPr>
-          <a:xfrm>
-            <a:off x="457200" y="1600200"/>
-            <a:ext cx="8229600" cy="4525963"/>
-          </a:xfrm>
-          <a:prstGeom prst="rect">
-            <a:avLst/>
-          </a:prstGeom>
-        </p:spPr>
-        <p:txBody>
           <a:bodyPr vert="horz" lIns="91440" tIns="45720" rIns="91440" bIns="45720" rtlCol="0">
             <a:normAutofit/>
           </a:bodyPr>
@@ -2681,7 +2899,7 @@
               <a:rPr lang="en-US" smtClean="0"/>
               <a:t>Fifth level</a:t>
             </a:r>
-            <a:endParaRPr lang="en-US"/>
+            <a:endParaRPr lang="en-US" dirty="0"/>
           </a:p>
         </p:txBody>
       </p:sp>
@@ -2697,7 +2915,7 @@
         </p:nvSpPr>
         <p:spPr>
           <a:xfrm>
-            <a:off x="457200" y="6356350"/>
+            <a:off x="457200" y="6356351"/>
             <a:ext cx="2133600" cy="365125"/>
           </a:xfrm>
           <a:prstGeom prst="rect">
@@ -2714,13 +2932,15 @@
                     <a:tint val="75000"/>
                   </a:schemeClr>
                 </a:solidFill>
+                <a:latin typeface="Helvetica LT Std Cond Light" pitchFamily="34" charset="0"/>
               </a:defRPr>
             </a:lvl1pPr>
           </a:lstStyle>
           <a:p>
             <a:fld id="{2F5BB042-2B17-413A-8BB2-6FDBD0381532}" type="datetimeFigureOut">
               <a:rPr lang="en-US" smtClean="0"/>
-              <a:t>8/12/2012</a:t>
+              <a:pPr/>
+              <a:t>10/10/2012</a:t>
             </a:fld>
             <a:endParaRPr lang="en-US"/>
           </a:p>
@@ -2738,7 +2958,7 @@
         </p:nvSpPr>
         <p:spPr>
           <a:xfrm>
-            <a:off x="3124200" y="6356350"/>
+            <a:off x="3124200" y="6356351"/>
             <a:ext cx="2895600" cy="365125"/>
           </a:xfrm>
           <a:prstGeom prst="rect">
@@ -2755,6 +2975,7 @@
                     <a:tint val="75000"/>
                   </a:schemeClr>
                 </a:solidFill>
+                <a:latin typeface="Helvetica LT Std Cond Light" pitchFamily="34" charset="0"/>
               </a:defRPr>
             </a:lvl1pPr>
           </a:lstStyle>
@@ -2775,7 +2996,7 @@
         </p:nvSpPr>
         <p:spPr>
           <a:xfrm>
-            <a:off x="6553200" y="6356350"/>
+            <a:off x="6553200" y="6356351"/>
             <a:ext cx="2133600" cy="365125"/>
           </a:xfrm>
           <a:prstGeom prst="rect">
@@ -2792,39 +3013,144 @@
                     <a:tint val="75000"/>
                   </a:schemeClr>
                 </a:solidFill>
+                <a:latin typeface="Helvetica LT Std Cond Light" pitchFamily="34" charset="0"/>
               </a:defRPr>
             </a:lvl1pPr>
           </a:lstStyle>
           <a:p>
             <a:fld id="{F130C7C2-E2F1-465B-8C07-FB00D7F0D149}" type="slidenum">
               <a:rPr lang="en-US" smtClean="0"/>
+              <a:pPr/>
               <a:t>‹#›</a:t>
             </a:fld>
             <a:endParaRPr lang="en-US"/>
           </a:p>
         </p:txBody>
       </p:sp>
+      <p:cxnSp>
+        <p:nvCxnSpPr>
+          <p:cNvPr id="7" name="Straight Connector 6"/>
+          <p:cNvCxnSpPr/>
+          <p:nvPr/>
+        </p:nvCxnSpPr>
+        <p:spPr>
+          <a:xfrm>
+            <a:off x="-76200" y="-7488"/>
+            <a:ext cx="9296400" cy="0"/>
+          </a:xfrm>
+          <a:prstGeom prst="line">
+            <a:avLst/>
+          </a:prstGeom>
+          <a:ln>
+            <a:solidFill>
+              <a:schemeClr val="tx1"/>
+            </a:solidFill>
+          </a:ln>
+          <a:effectLst>
+            <a:glow rad="76200">
+              <a:srgbClr val="EF9CBB">
+                <a:alpha val="35000"/>
+              </a:srgbClr>
+            </a:glow>
+          </a:effectLst>
+        </p:spPr>
+        <p:style>
+          <a:lnRef idx="1">
+            <a:schemeClr val="accent1"/>
+          </a:lnRef>
+          <a:fillRef idx="0">
+            <a:schemeClr val="accent1"/>
+          </a:fillRef>
+          <a:effectRef idx="0">
+            <a:schemeClr val="accent1"/>
+          </a:effectRef>
+          <a:fontRef idx="minor">
+            <a:schemeClr val="tx1"/>
+          </a:fontRef>
+        </p:style>
+      </p:cxnSp>
+      <p:cxnSp>
+        <p:nvCxnSpPr>
+          <p:cNvPr id="8" name="Straight Connector 7"/>
+          <p:cNvCxnSpPr/>
+          <p:nvPr/>
+        </p:nvCxnSpPr>
+        <p:spPr>
+          <a:xfrm>
+            <a:off x="-76200" y="6867144"/>
+            <a:ext cx="9296400" cy="0"/>
+          </a:xfrm>
+          <a:prstGeom prst="line">
+            <a:avLst/>
+          </a:prstGeom>
+          <a:ln>
+            <a:solidFill>
+              <a:schemeClr val="tx1"/>
+            </a:solidFill>
+          </a:ln>
+          <a:effectLst>
+            <a:glow rad="101600">
+              <a:srgbClr val="535A98">
+                <a:alpha val="40000"/>
+              </a:srgbClr>
+            </a:glow>
+          </a:effectLst>
+        </p:spPr>
+        <p:style>
+          <a:lnRef idx="1">
+            <a:schemeClr val="accent1"/>
+          </a:lnRef>
+          <a:fillRef idx="0">
+            <a:schemeClr val="accent1"/>
+          </a:fillRef>
+          <a:effectRef idx="0">
+            <a:schemeClr val="accent1"/>
+          </a:effectRef>
+          <a:fontRef idx="minor">
+            <a:schemeClr val="tx1"/>
+          </a:fontRef>
+        </p:style>
+      </p:cxnSp>
     </p:spTree>
     <p:extLst>
       <p:ext uri="{BB962C8B-B14F-4D97-AF65-F5344CB8AC3E}">
-        <p14:creationId xmlns:p14="http://schemas.microsoft.com/office/powerpoint/2010/main" val="1886214499"/>
+        <p14:creationId xmlns:p14="http://schemas.microsoft.com/office/powerpoint/2010/main" val="3605198005"/>
       </p:ext>
     </p:extLst>
   </p:cSld>
   <p:clrMap bg1="lt1" tx1="dk1" bg2="lt2" tx2="dk2" accent1="accent1" accent2="accent2" accent3="accent3" accent4="accent4" accent5="accent5" accent6="accent6" hlink="hlink" folHlink="folHlink"/>
   <p:sldLayoutIdLst>
-    <p:sldLayoutId id="2147483649" r:id="rId1"/>
-    <p:sldLayoutId id="2147483650" r:id="rId2"/>
-    <p:sldLayoutId id="2147483651" r:id="rId3"/>
-    <p:sldLayoutId id="2147483652" r:id="rId4"/>
-    <p:sldLayoutId id="2147483653" r:id="rId5"/>
-    <p:sldLayoutId id="2147483654" r:id="rId6"/>
-    <p:sldLayoutId id="2147483655" r:id="rId7"/>
-    <p:sldLayoutId id="2147483656" r:id="rId8"/>
-    <p:sldLayoutId id="2147483657" r:id="rId9"/>
-    <p:sldLayoutId id="2147483658" r:id="rId10"/>
-    <p:sldLayoutId id="2147483659" r:id="rId11"/>
+    <p:sldLayoutId id="2147483673" r:id="rId1"/>
+    <p:sldLayoutId id="2147483674" r:id="rId2"/>
+    <p:sldLayoutId id="2147483675" r:id="rId3"/>
+    <p:sldLayoutId id="2147483676" r:id="rId4"/>
+    <p:sldLayoutId id="2147483677" r:id="rId5"/>
+    <p:sldLayoutId id="2147483678" r:id="rId6"/>
+    <p:sldLayoutId id="2147483679" r:id="rId7"/>
+    <p:sldLayoutId id="2147483680" r:id="rId8"/>
+    <p:sldLayoutId id="2147483681" r:id="rId9"/>
+    <p:sldLayoutId id="2147483682" r:id="rId10"/>
+    <p:sldLayoutId id="2147483683" r:id="rId11"/>
   </p:sldLayoutIdLst>
+  <mc:AlternateContent xmlns:mc="http://schemas.openxmlformats.org/markup-compatibility/2006" xmlns:p14="http://schemas.microsoft.com/office/powerpoint/2010/main">
+    <mc:Choice Requires="p14">
+      <p:transition p14:dur="60">
+        <p:fade/>
+      </p:transition>
+    </mc:Choice>
+    <mc:Fallback xmlns="">
+      <p:transition>
+        <p:fade/>
+      </p:transition>
+    </mc:Fallback>
+  </mc:AlternateContent>
+  <p:timing>
+    <p:tnLst>
+      <p:par>
+        <p:cTn id="1" dur="indefinite" restart="never" nodeType="tmRoot"/>
+      </p:par>
+    </p:tnLst>
+  </p:timing>
   <p:txStyles>
     <p:titleStyle>
       <a:lvl1pPr algn="ctr" defTabSz="914400" rtl="0" eaLnBrk="1" latinLnBrk="0" hangingPunct="1">
@@ -2832,11 +3158,18 @@
           <a:spcPct val="0"/>
         </a:spcBef>
         <a:buNone/>
-        <a:defRPr sz="4400" kern="1200">
+        <a:defRPr sz="4400" kern="1200" spc="-150">
           <a:solidFill>
-            <a:schemeClr val="tx1"/>
+            <a:schemeClr val="bg1"/>
           </a:solidFill>
-          <a:latin typeface="+mj-lt"/>
+          <a:effectLst>
+            <a:outerShdw blurRad="38100" dist="38100" dir="2700000" algn="tl">
+              <a:srgbClr val="000000">
+                <a:alpha val="43137"/>
+              </a:srgbClr>
+            </a:outerShdw>
+          </a:effectLst>
+          <a:latin typeface="HelveticaNeueLT Com 95 Blk" pitchFamily="34" charset="0"/>
           <a:ea typeface="+mj-ea"/>
           <a:cs typeface="+mj-cs"/>
         </a:defRPr>
@@ -2847,13 +3180,15 @@
         <a:spcBef>
           <a:spcPct val="20000"/>
         </a:spcBef>
-        <a:buFont typeface="Arial" pitchFamily="34" charset="0"/>
-        <a:buChar char="•"/>
+        <a:buFontTx/>
+        <a:buBlip>
+          <a:blip r:embed="rId15"/>
+        </a:buBlip>
         <a:defRPr sz="3200" kern="1200">
           <a:solidFill>
-            <a:schemeClr val="tx1"/>
+            <a:srgbClr val="677379"/>
           </a:solidFill>
-          <a:latin typeface="+mn-lt"/>
+          <a:latin typeface="Helvetica LT Std Cond" pitchFamily="34" charset="0"/>
           <a:ea typeface="+mn-ea"/>
           <a:cs typeface="+mn-cs"/>
         </a:defRPr>
@@ -2862,13 +3197,15 @@
         <a:spcBef>
           <a:spcPct val="20000"/>
         </a:spcBef>
-        <a:buFont typeface="Arial" pitchFamily="34" charset="0"/>
-        <a:buChar char="–"/>
+        <a:buFontTx/>
+        <a:buBlip>
+          <a:blip r:embed="rId16"/>
+        </a:buBlip>
         <a:defRPr sz="2800" kern="1200">
           <a:solidFill>
-            <a:schemeClr val="tx1"/>
+            <a:srgbClr val="677379"/>
           </a:solidFill>
-          <a:latin typeface="+mn-lt"/>
+          <a:latin typeface="Helvetica LT Std Cond" pitchFamily="34" charset="0"/>
           <a:ea typeface="+mn-ea"/>
           <a:cs typeface="+mn-cs"/>
         </a:defRPr>
@@ -2877,13 +3214,15 @@
         <a:spcBef>
           <a:spcPct val="20000"/>
         </a:spcBef>
-        <a:buFont typeface="Arial" pitchFamily="34" charset="0"/>
-        <a:buChar char="•"/>
+        <a:buFontTx/>
+        <a:buBlip>
+          <a:blip r:embed="rId17"/>
+        </a:buBlip>
         <a:defRPr sz="2400" kern="1200">
           <a:solidFill>
-            <a:schemeClr val="tx1"/>
+            <a:srgbClr val="677379"/>
           </a:solidFill>
-          <a:latin typeface="+mn-lt"/>
+          <a:latin typeface="Helvetica LT Std Cond" pitchFamily="34" charset="0"/>
           <a:ea typeface="+mn-ea"/>
           <a:cs typeface="+mn-cs"/>
         </a:defRPr>
@@ -2892,13 +3231,15 @@
         <a:spcBef>
           <a:spcPct val="20000"/>
         </a:spcBef>
-        <a:buFont typeface="Arial" pitchFamily="34" charset="0"/>
-        <a:buChar char="–"/>
+        <a:buFontTx/>
+        <a:buBlip>
+          <a:blip r:embed="rId18"/>
+        </a:buBlip>
         <a:defRPr sz="2000" kern="1200">
           <a:solidFill>
-            <a:schemeClr val="tx1"/>
+            <a:srgbClr val="677379"/>
           </a:solidFill>
-          <a:latin typeface="+mn-lt"/>
+          <a:latin typeface="Helvetica LT Std Cond" pitchFamily="34" charset="0"/>
           <a:ea typeface="+mn-ea"/>
           <a:cs typeface="+mn-cs"/>
         </a:defRPr>
@@ -2907,13 +3248,15 @@
         <a:spcBef>
           <a:spcPct val="20000"/>
         </a:spcBef>
-        <a:buFont typeface="Arial" pitchFamily="34" charset="0"/>
-        <a:buChar char="»"/>
+        <a:buFontTx/>
+        <a:buBlip>
+          <a:blip r:embed="rId19"/>
+        </a:buBlip>
         <a:defRPr sz="2000" kern="1200">
           <a:solidFill>
-            <a:schemeClr val="tx1"/>
+            <a:srgbClr val="677379"/>
           </a:solidFill>
-          <a:latin typeface="+mn-lt"/>
+          <a:latin typeface="Helvetica LT Std Cond" pitchFamily="34" charset="0"/>
           <a:ea typeface="+mn-ea"/>
           <a:cs typeface="+mn-cs"/>
         </a:defRPr>
@@ -3110,29 +3453,633 @@
           <a:bodyPr/>
           <a:lstStyle/>
           <a:p>
-            <a:endParaRPr lang="en-US"/>
-          </a:p>
-        </p:txBody>
-      </p:sp>
-      <p:sp>
-        <p:nvSpPr>
-          <p:cNvPr id="3" name="Subtitle 2"/>
-          <p:cNvSpPr>
-            <a:spLocks noGrp="1"/>
-          </p:cNvSpPr>
-          <p:nvPr>
-            <p:ph type="subTitle" idx="1"/>
-          </p:nvPr>
-        </p:nvSpPr>
-        <p:spPr/>
-        <p:txBody>
-          <a:bodyPr/>
+            <a:r>
+              <a:rPr lang="en-US" dirty="0" smtClean="0"/>
+              <a:t>Cla</a:t>
+            </a:r>
+            <a:r>
+              <a:rPr lang="en-US" spc="-300" dirty="0" smtClean="0"/>
+              <a:t>s</a:t>
+            </a:r>
+            <a:r>
+              <a:rPr lang="en-US" dirty="0" smtClean="0"/>
+              <a:t>sy Gam</a:t>
+            </a:r>
+            <a:r>
+              <a:rPr lang="en-US" spc="-300" dirty="0" smtClean="0"/>
+              <a:t>e</a:t>
+            </a:r>
+            <a:r>
+              <a:rPr lang="en-US" dirty="0" smtClean="0"/>
+              <a:t>s</a:t>
+            </a:r>
+            <a:endParaRPr lang="en-US" dirty="0"/>
+          </a:p>
+        </p:txBody>
+      </p:sp>
+      <p:graphicFrame>
+        <p:nvGraphicFramePr>
+          <p:cNvPr id="4" name="Table 3"/>
+          <p:cNvGraphicFramePr>
+            <a:graphicFrameLocks noGrp="1"/>
+          </p:cNvGraphicFramePr>
+          <p:nvPr>
+            <p:extLst>
+              <p:ext uri="{D42A27DB-BD31-4B8C-83A1-F6EECF244321}">
+                <p14:modId xmlns:p14="http://schemas.microsoft.com/office/powerpoint/2010/main" val="862185735"/>
+              </p:ext>
+            </p:extLst>
+          </p:nvPr>
+        </p:nvGraphicFramePr>
+        <p:xfrm>
+          <a:off x="-76200" y="4038600"/>
+          <a:ext cx="9378564" cy="1828800"/>
+        </p:xfrm>
+        <a:graphic>
+          <a:graphicData uri="http://schemas.openxmlformats.org/drawingml/2006/table">
+            <a:tbl>
+              <a:tblPr>
+                <a:tableStyleId>{5C22544A-7EE6-4342-B048-85BDC9FD1C3A}</a:tableStyleId>
+              </a:tblPr>
+              <a:tblGrid>
+                <a:gridCol w="3126188"/>
+                <a:gridCol w="3126188"/>
+                <a:gridCol w="3126188"/>
+              </a:tblGrid>
+              <a:tr h="914400">
+                <a:tc>
+                  <a:txBody>
+                    <a:bodyPr/>
+                    <a:lstStyle/>
+                    <a:p>
+                      <a:pPr marL="0" marR="0" indent="0" algn="ctr" defTabSz="914400" rtl="0" eaLnBrk="1" fontAlgn="auto" latinLnBrk="0" hangingPunct="1">
+                        <a:lnSpc>
+                          <a:spcPct val="100000"/>
+                        </a:lnSpc>
+                        <a:spcBef>
+                          <a:spcPts val="0"/>
+                        </a:spcBef>
+                        <a:spcAft>
+                          <a:spcPts val="0"/>
+                        </a:spcAft>
+                        <a:buClrTx/>
+                        <a:buSzTx/>
+                        <a:buFontTx/>
+                        <a:buNone/>
+                        <a:tabLst/>
+                        <a:defRPr/>
+                      </a:pPr>
+                      <a:r>
+                        <a:rPr lang="en-US" sz="3200" b="0" kern="1200" dirty="0" err="1" smtClean="0">
+                          <a:solidFill>
+                            <a:schemeClr val="tx1">
+                              <a:tint val="75000"/>
+                            </a:schemeClr>
+                          </a:solidFill>
+                          <a:latin typeface="Helvetica LT Std Cond" pitchFamily="34" charset="0"/>
+                          <a:ea typeface="+mn-ea"/>
+                          <a:cs typeface="+mn-cs"/>
+                        </a:rPr>
+                        <a:t>Geonathan</a:t>
+                      </a:r>
+                      <a:r>
+                        <a:rPr lang="en-US" sz="3200" b="0" kern="1200" dirty="0" smtClean="0">
+                          <a:solidFill>
+                            <a:schemeClr val="tx1">
+                              <a:tint val="75000"/>
+                            </a:schemeClr>
+                          </a:solidFill>
+                          <a:latin typeface="Helvetica LT Std Cond" pitchFamily="34" charset="0"/>
+                          <a:ea typeface="+mn-ea"/>
+                          <a:cs typeface="+mn-cs"/>
+                        </a:rPr>
+                        <a:t> </a:t>
+                      </a:r>
+                      <a:r>
+                        <a:rPr lang="en-US" sz="3200" b="0" kern="1200" dirty="0" err="1" smtClean="0">
+                          <a:solidFill>
+                            <a:schemeClr val="tx1">
+                              <a:tint val="75000"/>
+                            </a:schemeClr>
+                          </a:solidFill>
+                          <a:latin typeface="Helvetica LT Std Cond" pitchFamily="34" charset="0"/>
+                          <a:ea typeface="+mn-ea"/>
+                          <a:cs typeface="+mn-cs"/>
+                        </a:rPr>
+                        <a:t>Sena</a:t>
+                      </a:r>
+                      <a:endParaRPr lang="en-US" sz="3200" b="0" kern="1200" dirty="0" smtClean="0">
+                        <a:solidFill>
+                          <a:schemeClr val="tx1">
+                            <a:tint val="75000"/>
+                          </a:schemeClr>
+                        </a:solidFill>
+                        <a:latin typeface="Helvetica LT Std Cond" pitchFamily="34" charset="0"/>
+                        <a:ea typeface="+mn-ea"/>
+                        <a:cs typeface="+mn-cs"/>
+                      </a:endParaRPr>
+                    </a:p>
+                  </a:txBody>
+                  <a:tcPr anchor="ctr">
+                    <a:lnL w="12700" cmpd="sng">
+                      <a:noFill/>
+                    </a:lnL>
+                    <a:lnR w="12700" cmpd="sng">
+                      <a:noFill/>
+                    </a:lnR>
+                    <a:lnT w="12700" cmpd="sng">
+                      <a:noFill/>
+                    </a:lnT>
+                    <a:lnB w="38100" cmpd="sng">
+                      <a:noFill/>
+                    </a:lnB>
+                    <a:lnTlToBr w="12700" cmpd="sng">
+                      <a:noFill/>
+                      <a:prstDash val="solid"/>
+                    </a:lnTlToBr>
+                    <a:lnBlToTr w="12700" cmpd="sng">
+                      <a:noFill/>
+                      <a:prstDash val="solid"/>
+                    </a:lnBlToTr>
+                    <a:noFill/>
+                  </a:tcPr>
+                </a:tc>
+                <a:tc>
+                  <a:txBody>
+                    <a:bodyPr/>
+                    <a:lstStyle/>
+                    <a:p>
+                      <a:pPr marL="0" algn="ctr" defTabSz="914400" rtl="0" eaLnBrk="1" latinLnBrk="0" hangingPunct="1"/>
+                      <a:r>
+                        <a:rPr lang="en-US" sz="3600" b="0" kern="1200" dirty="0" smtClean="0">
+                          <a:solidFill>
+                            <a:schemeClr val="tx1">
+                              <a:tint val="75000"/>
+                            </a:schemeClr>
+                          </a:solidFill>
+                          <a:effectLst/>
+                          <a:latin typeface="Helvetica LT Std Cond" pitchFamily="34" charset="0"/>
+                          <a:ea typeface="+mn-ea"/>
+                          <a:cs typeface="+mn-cs"/>
+                        </a:rPr>
+                        <a:t>Charles </a:t>
+                      </a:r>
+                      <a:r>
+                        <a:rPr lang="en-US" sz="3600" b="0" kern="1200" dirty="0" err="1" smtClean="0">
+                          <a:solidFill>
+                            <a:schemeClr val="tx1">
+                              <a:tint val="75000"/>
+                            </a:schemeClr>
+                          </a:solidFill>
+                          <a:effectLst/>
+                          <a:latin typeface="Helvetica LT Std Cond" pitchFamily="34" charset="0"/>
+                          <a:ea typeface="+mn-ea"/>
+                          <a:cs typeface="+mn-cs"/>
+                        </a:rPr>
+                        <a:t>Madere</a:t>
+                      </a:r>
+                      <a:endParaRPr lang="en-US" sz="3600" b="0" kern="1200" dirty="0">
+                        <a:solidFill>
+                          <a:schemeClr val="tx1">
+                            <a:tint val="75000"/>
+                          </a:schemeClr>
+                        </a:solidFill>
+                        <a:effectLst/>
+                        <a:latin typeface="Helvetica LT Std Cond" pitchFamily="34" charset="0"/>
+                        <a:ea typeface="+mn-ea"/>
+                        <a:cs typeface="+mn-cs"/>
+                      </a:endParaRPr>
+                    </a:p>
+                  </a:txBody>
+                  <a:tcPr anchor="ctr">
+                    <a:lnL w="12700" cmpd="sng">
+                      <a:noFill/>
+                    </a:lnL>
+                    <a:lnR w="12700" cmpd="sng">
+                      <a:noFill/>
+                    </a:lnR>
+                    <a:lnT w="12700" cmpd="sng">
+                      <a:noFill/>
+                    </a:lnT>
+                    <a:lnB w="38100" cmpd="sng">
+                      <a:noFill/>
+                    </a:lnB>
+                    <a:lnTlToBr w="12700" cmpd="sng">
+                      <a:noFill/>
+                      <a:prstDash val="solid"/>
+                    </a:lnTlToBr>
+                    <a:lnBlToTr w="12700" cmpd="sng">
+                      <a:noFill/>
+                      <a:prstDash val="solid"/>
+                    </a:lnBlToTr>
+                    <a:noFill/>
+                  </a:tcPr>
+                </a:tc>
+                <a:tc>
+                  <a:txBody>
+                    <a:bodyPr/>
+                    <a:lstStyle/>
+                    <a:p>
+                      <a:pPr marL="0" marR="0" indent="0" algn="ctr" defTabSz="914400" rtl="0" eaLnBrk="1" fontAlgn="auto" latinLnBrk="0" hangingPunct="1">
+                        <a:lnSpc>
+                          <a:spcPct val="100000"/>
+                        </a:lnSpc>
+                        <a:spcBef>
+                          <a:spcPts val="0"/>
+                        </a:spcBef>
+                        <a:spcAft>
+                          <a:spcPts val="0"/>
+                        </a:spcAft>
+                        <a:buClrTx/>
+                        <a:buSzTx/>
+                        <a:buFontTx/>
+                        <a:buNone/>
+                        <a:tabLst/>
+                        <a:defRPr/>
+                      </a:pPr>
+                      <a:r>
+                        <a:rPr lang="en-US" sz="3200" b="0" kern="1200" dirty="0" err="1" smtClean="0">
+                          <a:solidFill>
+                            <a:schemeClr val="tx1">
+                              <a:tint val="75000"/>
+                            </a:schemeClr>
+                          </a:solidFill>
+                          <a:latin typeface="Helvetica LT Std Cond" pitchFamily="34" charset="0"/>
+                          <a:ea typeface="+mn-ea"/>
+                          <a:cs typeface="+mn-cs"/>
+                        </a:rPr>
+                        <a:t>Jarrad</a:t>
+                      </a:r>
+                      <a:r>
+                        <a:rPr lang="en-US" sz="3200" b="0" kern="1200" dirty="0" smtClean="0">
+                          <a:solidFill>
+                            <a:schemeClr val="tx1">
+                              <a:tint val="75000"/>
+                            </a:schemeClr>
+                          </a:solidFill>
+                          <a:latin typeface="Helvetica LT Std Cond" pitchFamily="34" charset="0"/>
+                          <a:ea typeface="+mn-ea"/>
+                          <a:cs typeface="+mn-cs"/>
+                        </a:rPr>
+                        <a:t> </a:t>
+                      </a:r>
+                      <a:r>
+                        <a:rPr lang="en-US" sz="3200" b="0" kern="1200" dirty="0" err="1" smtClean="0">
+                          <a:solidFill>
+                            <a:schemeClr val="tx1">
+                              <a:tint val="75000"/>
+                            </a:schemeClr>
+                          </a:solidFill>
+                          <a:latin typeface="Helvetica LT Std Cond" pitchFamily="34" charset="0"/>
+                          <a:ea typeface="+mn-ea"/>
+                          <a:cs typeface="+mn-cs"/>
+                        </a:rPr>
+                        <a:t>Pinestraw</a:t>
+                      </a:r>
+                      <a:endParaRPr lang="en-US" sz="3200" b="0" kern="1200" dirty="0" smtClean="0">
+                        <a:solidFill>
+                          <a:schemeClr val="tx1">
+                            <a:tint val="75000"/>
+                          </a:schemeClr>
+                        </a:solidFill>
+                        <a:latin typeface="Helvetica LT Std Cond" pitchFamily="34" charset="0"/>
+                        <a:ea typeface="+mn-ea"/>
+                        <a:cs typeface="+mn-cs"/>
+                      </a:endParaRPr>
+                    </a:p>
+                  </a:txBody>
+                  <a:tcPr anchor="ctr">
+                    <a:lnL w="12700" cmpd="sng">
+                      <a:noFill/>
+                    </a:lnL>
+                    <a:lnR w="12700" cmpd="sng">
+                      <a:noFill/>
+                    </a:lnR>
+                    <a:lnT w="12700" cmpd="sng">
+                      <a:noFill/>
+                    </a:lnT>
+                    <a:lnB w="38100" cmpd="sng">
+                      <a:noFill/>
+                    </a:lnB>
+                    <a:lnTlToBr w="12700" cmpd="sng">
+                      <a:noFill/>
+                      <a:prstDash val="solid"/>
+                    </a:lnTlToBr>
+                    <a:lnBlToTr w="12700" cmpd="sng">
+                      <a:noFill/>
+                      <a:prstDash val="solid"/>
+                    </a:lnBlToTr>
+                    <a:noFill/>
+                  </a:tcPr>
+                </a:tc>
+              </a:tr>
+              <a:tr h="914400">
+                <a:tc>
+                  <a:txBody>
+                    <a:bodyPr/>
+                    <a:lstStyle/>
+                    <a:p>
+                      <a:pPr marL="0" marR="0" indent="0" algn="ctr" defTabSz="914400" rtl="0" eaLnBrk="1" fontAlgn="auto" latinLnBrk="0" hangingPunct="1">
+                        <a:lnSpc>
+                          <a:spcPct val="100000"/>
+                        </a:lnSpc>
+                        <a:spcBef>
+                          <a:spcPts val="0"/>
+                        </a:spcBef>
+                        <a:spcAft>
+                          <a:spcPts val="0"/>
+                        </a:spcAft>
+                        <a:buClrTx/>
+                        <a:buSzTx/>
+                        <a:buFontTx/>
+                        <a:buNone/>
+                        <a:tabLst/>
+                        <a:defRPr/>
+                      </a:pPr>
+                      <a:r>
+                        <a:rPr lang="en-US" sz="3200" b="0" kern="1200" dirty="0" err="1" smtClean="0">
+                          <a:solidFill>
+                            <a:schemeClr val="tx1">
+                              <a:tint val="75000"/>
+                            </a:schemeClr>
+                          </a:solidFill>
+                          <a:latin typeface="Helvetica LT Std Cond" pitchFamily="34" charset="0"/>
+                          <a:ea typeface="+mn-ea"/>
+                          <a:cs typeface="+mn-cs"/>
+                        </a:rPr>
+                        <a:t>Subhanga</a:t>
+                      </a:r>
+                      <a:r>
+                        <a:rPr lang="en-US" sz="3200" b="0" kern="1200" dirty="0" smtClean="0">
+                          <a:solidFill>
+                            <a:schemeClr val="tx1">
+                              <a:tint val="75000"/>
+                            </a:schemeClr>
+                          </a:solidFill>
+                          <a:latin typeface="Helvetica LT Std Cond" pitchFamily="34" charset="0"/>
+                          <a:ea typeface="+mn-ea"/>
+                          <a:cs typeface="+mn-cs"/>
+                        </a:rPr>
+                        <a:t> Dixit</a:t>
+                      </a:r>
+                    </a:p>
+                  </a:txBody>
+                  <a:tcPr anchor="ctr">
+                    <a:lnL w="12700" cmpd="sng">
+                      <a:noFill/>
+                    </a:lnL>
+                    <a:lnR w="12700" cmpd="sng">
+                      <a:noFill/>
+                    </a:lnR>
+                    <a:lnT w="38100" cmpd="sng">
+                      <a:noFill/>
+                    </a:lnT>
+                    <a:lnB w="12700" cmpd="sng">
+                      <a:noFill/>
+                    </a:lnB>
+                    <a:lnTlToBr w="12700" cmpd="sng">
+                      <a:noFill/>
+                      <a:prstDash val="solid"/>
+                    </a:lnTlToBr>
+                    <a:lnBlToTr w="12700" cmpd="sng">
+                      <a:noFill/>
+                      <a:prstDash val="solid"/>
+                    </a:lnBlToTr>
+                    <a:noFill/>
+                  </a:tcPr>
+                </a:tc>
+                <a:tc>
+                  <a:txBody>
+                    <a:bodyPr/>
+                    <a:lstStyle/>
+                    <a:p>
+                      <a:pPr marL="0" algn="ctr" defTabSz="914400" rtl="0" eaLnBrk="1" latinLnBrk="0" hangingPunct="1"/>
+                      <a:r>
+                        <a:rPr lang="en-US" sz="3200" b="0" kern="1200" dirty="0" smtClean="0">
+                          <a:solidFill>
+                            <a:schemeClr val="tx1">
+                              <a:tint val="75000"/>
+                            </a:schemeClr>
+                          </a:solidFill>
+                          <a:effectLst/>
+                          <a:latin typeface="Helvetica LT Std Cond" pitchFamily="34" charset="0"/>
+                          <a:ea typeface="+mn-ea"/>
+                          <a:cs typeface="+mn-cs"/>
+                        </a:rPr>
+                        <a:t>Tristan Kidder</a:t>
+                      </a:r>
+                      <a:endParaRPr lang="en-US" sz="3200" b="0" kern="1200" dirty="0">
+                        <a:solidFill>
+                          <a:schemeClr val="tx1">
+                            <a:tint val="75000"/>
+                          </a:schemeClr>
+                        </a:solidFill>
+                        <a:effectLst/>
+                        <a:latin typeface="Helvetica LT Std Cond" pitchFamily="34" charset="0"/>
+                        <a:ea typeface="+mn-ea"/>
+                        <a:cs typeface="+mn-cs"/>
+                      </a:endParaRPr>
+                    </a:p>
+                  </a:txBody>
+                  <a:tcPr anchor="ctr">
+                    <a:lnL w="12700" cmpd="sng">
+                      <a:noFill/>
+                    </a:lnL>
+                    <a:lnR w="12700" cmpd="sng">
+                      <a:noFill/>
+                    </a:lnR>
+                    <a:lnT w="38100" cmpd="sng">
+                      <a:noFill/>
+                    </a:lnT>
+                    <a:lnB w="12700" cmpd="sng">
+                      <a:noFill/>
+                    </a:lnB>
+                    <a:lnTlToBr w="12700" cmpd="sng">
+                      <a:noFill/>
+                      <a:prstDash val="solid"/>
+                    </a:lnTlToBr>
+                    <a:lnBlToTr w="12700" cmpd="sng">
+                      <a:noFill/>
+                      <a:prstDash val="solid"/>
+                    </a:lnBlToTr>
+                    <a:noFill/>
+                  </a:tcPr>
+                </a:tc>
+                <a:tc>
+                  <a:txBody>
+                    <a:bodyPr/>
+                    <a:lstStyle/>
+                    <a:p>
+                      <a:pPr marL="0" marR="0" indent="0" algn="ctr" defTabSz="914400" rtl="0" eaLnBrk="1" fontAlgn="auto" latinLnBrk="0" hangingPunct="1">
+                        <a:lnSpc>
+                          <a:spcPct val="100000"/>
+                        </a:lnSpc>
+                        <a:spcBef>
+                          <a:spcPts val="0"/>
+                        </a:spcBef>
+                        <a:spcAft>
+                          <a:spcPts val="0"/>
+                        </a:spcAft>
+                        <a:buClrTx/>
+                        <a:buSzTx/>
+                        <a:buFontTx/>
+                        <a:buNone/>
+                        <a:tabLst/>
+                        <a:defRPr/>
+                      </a:pPr>
+                      <a:r>
+                        <a:rPr lang="en-US" sz="3200" b="0" kern="1200" dirty="0" smtClean="0">
+                          <a:solidFill>
+                            <a:schemeClr val="tx1">
+                              <a:tint val="75000"/>
+                            </a:schemeClr>
+                          </a:solidFill>
+                          <a:latin typeface="Helvetica LT Std Cond" pitchFamily="34" charset="0"/>
+                          <a:ea typeface="+mn-ea"/>
+                          <a:cs typeface="+mn-cs"/>
+                        </a:rPr>
+                        <a:t>Cory </a:t>
+                      </a:r>
+                      <a:r>
+                        <a:rPr lang="en-US" sz="3200" b="0" kern="1200" dirty="0" err="1" smtClean="0">
+                          <a:solidFill>
+                            <a:schemeClr val="tx1">
+                              <a:tint val="75000"/>
+                            </a:schemeClr>
+                          </a:solidFill>
+                          <a:latin typeface="Helvetica LT Std Cond" pitchFamily="34" charset="0"/>
+                          <a:ea typeface="+mn-ea"/>
+                          <a:cs typeface="+mn-cs"/>
+                        </a:rPr>
+                        <a:t>Vicknair</a:t>
+                      </a:r>
+                      <a:endParaRPr lang="en-US" sz="3200" b="0" kern="1200" dirty="0" smtClean="0">
+                        <a:solidFill>
+                          <a:schemeClr val="tx1">
+                            <a:tint val="75000"/>
+                          </a:schemeClr>
+                        </a:solidFill>
+                        <a:latin typeface="Helvetica LT Std Cond" pitchFamily="34" charset="0"/>
+                        <a:ea typeface="+mn-ea"/>
+                        <a:cs typeface="+mn-cs"/>
+                      </a:endParaRPr>
+                    </a:p>
+                  </a:txBody>
+                  <a:tcPr anchor="ctr">
+                    <a:lnL w="12700" cmpd="sng">
+                      <a:noFill/>
+                    </a:lnL>
+                    <a:lnR w="12700" cmpd="sng">
+                      <a:noFill/>
+                    </a:lnR>
+                    <a:lnT w="38100" cmpd="sng">
+                      <a:noFill/>
+                    </a:lnT>
+                    <a:lnB w="12700" cmpd="sng">
+                      <a:noFill/>
+                    </a:lnB>
+                    <a:lnTlToBr w="12700" cmpd="sng">
+                      <a:noFill/>
+                      <a:prstDash val="solid"/>
+                    </a:lnTlToBr>
+                    <a:lnBlToTr w="12700" cmpd="sng">
+                      <a:noFill/>
+                      <a:prstDash val="solid"/>
+                    </a:lnBlToTr>
+                    <a:noFill/>
+                  </a:tcPr>
+                </a:tc>
+              </a:tr>
+            </a:tbl>
+          </a:graphicData>
+        </a:graphic>
+      </p:graphicFrame>
+      <p:sp>
+        <p:nvSpPr>
+          <p:cNvPr id="3" name="TextBox 2"/>
+          <p:cNvSpPr txBox="1"/>
+          <p:nvPr/>
+        </p:nvSpPr>
+        <p:spPr>
+          <a:xfrm>
+            <a:off x="3507761" y="6324600"/>
+            <a:ext cx="3962400" cy="369332"/>
+          </a:xfrm>
+          <a:prstGeom prst="rect">
+            <a:avLst/>
+          </a:prstGeom>
+          <a:noFill/>
+        </p:spPr>
+        <p:txBody>
+          <a:bodyPr wrap="square" rtlCol="0">
+            <a:spAutoFit/>
+          </a:bodyPr>
           <a:lstStyle/>
           <a:p>
-            <a:endParaRPr lang="en-US"/>
-          </a:p>
-        </p:txBody>
-      </p:sp>
+            <a:r>
+              <a:rPr lang="en-US" dirty="0" smtClean="0">
+                <a:solidFill>
+                  <a:srgbClr val="677379"/>
+                </a:solidFill>
+                <a:latin typeface="Helvetica LT Std Light" pitchFamily="34" charset="0"/>
+              </a:rPr>
+              <a:t>/ </a:t>
+            </a:r>
+            <a:r>
+              <a:rPr lang="en-US" dirty="0" err="1" smtClean="0">
+                <a:solidFill>
+                  <a:srgbClr val="677379"/>
+                </a:solidFill>
+                <a:latin typeface="Helvetica LT Std Light" pitchFamily="34" charset="0"/>
+              </a:rPr>
+              <a:t>ClassyGamesCommunity</a:t>
+            </a:r>
+            <a:endParaRPr lang="en-US" dirty="0">
+              <a:solidFill>
+                <a:srgbClr val="677379"/>
+              </a:solidFill>
+              <a:latin typeface="Helvetica LT Std Light" pitchFamily="34" charset="0"/>
+            </a:endParaRPr>
+          </a:p>
+        </p:txBody>
+      </p:sp>
+      <p:pic>
+        <p:nvPicPr>
+          <p:cNvPr id="5" name="Picture 4"/>
+          <p:cNvPicPr>
+            <a:picLocks noChangeAspect="1"/>
+          </p:cNvPicPr>
+          <p:nvPr/>
+        </p:nvPicPr>
+        <p:blipFill>
+          <a:blip r:embed="rId2">
+            <a:extLst>
+              <a:ext uri="{28A0092B-C50C-407E-A947-70E740481C1C}">
+                <a14:useLocalDpi xmlns:a14="http://schemas.microsoft.com/office/drawing/2010/main" val="0"/>
+              </a:ext>
+            </a:extLst>
+          </a:blip>
+          <a:stretch>
+            <a:fillRect/>
+          </a:stretch>
+        </p:blipFill>
+        <p:spPr>
+          <a:xfrm>
+            <a:off x="3200400" y="6356866"/>
+            <a:ext cx="304800" cy="304800"/>
+          </a:xfrm>
+          <a:prstGeom prst="rect">
+            <a:avLst/>
+          </a:prstGeom>
+          <a:effectLst>
+            <a:outerShdw blurRad="63500" sx="102000" sy="102000" algn="ctr" rotWithShape="0">
+              <a:srgbClr val="535A98">
+                <a:alpha val="52000"/>
+              </a:srgbClr>
+            </a:outerShdw>
+          </a:effectLst>
+        </p:spPr>
+      </p:pic>
     </p:spTree>
     <p:extLst>
       <p:ext uri="{BB962C8B-B14F-4D97-AF65-F5344CB8AC3E}">
@@ -3143,11 +4090,745 @@
   <p:clrMapOvr>
     <a:masterClrMapping/>
   </p:clrMapOvr>
+  <mc:AlternateContent xmlns:mc="http://schemas.openxmlformats.org/markup-compatibility/2006" xmlns:p14="http://schemas.microsoft.com/office/powerpoint/2010/main">
+    <mc:Choice Requires="p14">
+      <p:transition p14:dur="60">
+        <p:fade/>
+      </p:transition>
+    </mc:Choice>
+    <mc:Fallback xmlns="">
+      <p:transition>
+        <p:fade/>
+      </p:transition>
+    </mc:Fallback>
+  </mc:AlternateContent>
+  <p:timing>
+    <p:tnLst>
+      <p:par>
+        <p:cTn id="1" dur="indefinite" restart="never" nodeType="tmRoot"/>
+      </p:par>
+    </p:tnLst>
+  </p:timing>
+</p:sld>
+</file>
+
+<file path=ppt/slides/slide2.xml><?xml version="1.0" encoding="utf-8"?>
+<p:sld xmlns:a="http://schemas.openxmlformats.org/drawingml/2006/main" xmlns:r="http://schemas.openxmlformats.org/officeDocument/2006/relationships" xmlns:p="http://schemas.openxmlformats.org/presentationml/2006/main">
+  <p:cSld>
+    <p:spTree>
+      <p:nvGrpSpPr>
+        <p:cNvPr id="1" name=""/>
+        <p:cNvGrpSpPr/>
+        <p:nvPr/>
+      </p:nvGrpSpPr>
+      <p:grpSpPr>
+        <a:xfrm>
+          <a:off x="0" y="0"/>
+          <a:ext cx="0" cy="0"/>
+          <a:chOff x="0" y="0"/>
+          <a:chExt cx="0" cy="0"/>
+        </a:xfrm>
+      </p:grpSpPr>
+      <p:sp>
+        <p:nvSpPr>
+          <p:cNvPr id="2" name="Title 1"/>
+          <p:cNvSpPr>
+            <a:spLocks noGrp="1"/>
+          </p:cNvSpPr>
+          <p:nvPr>
+            <p:ph type="title"/>
+          </p:nvPr>
+        </p:nvSpPr>
+        <p:spPr/>
+        <p:txBody>
+          <a:bodyPr/>
+          <a:lstStyle/>
+          <a:p>
+            <a:r>
+              <a:rPr lang="en-US" dirty="0" smtClean="0"/>
+              <a:t>our p</a:t>
+            </a:r>
+            <a:r>
+              <a:rPr lang="en-US" spc="0" dirty="0" smtClean="0"/>
+              <a:t>r</a:t>
+            </a:r>
+            <a:r>
+              <a:rPr lang="en-US" dirty="0" smtClean="0"/>
+              <a:t>oject is</a:t>
+            </a:r>
+            <a:endParaRPr lang="en-US" dirty="0"/>
+          </a:p>
+        </p:txBody>
+      </p:sp>
+      <p:sp>
+        <p:nvSpPr>
+          <p:cNvPr id="3" name="Content Placeholder 2"/>
+          <p:cNvSpPr>
+            <a:spLocks noGrp="1"/>
+          </p:cNvSpPr>
+          <p:nvPr>
+            <p:ph idx="1"/>
+          </p:nvPr>
+        </p:nvSpPr>
+        <p:spPr>
+          <a:xfrm>
+            <a:off x="457200" y="1600200"/>
+            <a:ext cx="8229600" cy="5257800"/>
+          </a:xfrm>
+        </p:spPr>
+        <p:txBody>
+          <a:bodyPr>
+            <a:normAutofit/>
+          </a:bodyPr>
+          <a:lstStyle/>
+          <a:p>
+            <a:r>
+              <a:rPr lang="en-US" dirty="0" smtClean="0"/>
+              <a:t>A natively built Android application</a:t>
+            </a:r>
+          </a:p>
+          <a:p>
+            <a:r>
+              <a:rPr lang="en-US" dirty="0" smtClean="0"/>
+              <a:t>Socially connected with the Facebook SDK</a:t>
+            </a:r>
+          </a:p>
+          <a:p>
+            <a:r>
+              <a:rPr lang="en-US" dirty="0" smtClean="0"/>
+              <a:t>Cloud powered with Amazon Web Services</a:t>
+            </a:r>
+          </a:p>
+          <a:p>
+            <a:r>
+              <a:rPr lang="en-US" dirty="0" smtClean="0"/>
+              <a:t>Designed with newer Android devices in mind</a:t>
+            </a:r>
+          </a:p>
+          <a:p>
+            <a:pPr lvl="1"/>
+            <a:r>
+              <a:rPr lang="en-US" dirty="0" smtClean="0"/>
+              <a:t>Follows Android 3.0+ design guidelines</a:t>
+            </a:r>
+          </a:p>
+          <a:p>
+            <a:pPr lvl="2"/>
+            <a:r>
+              <a:rPr lang="en-US" dirty="0" smtClean="0"/>
+              <a:t>No hardware buttons required through the use of the new Android Action Bar</a:t>
+            </a:r>
+          </a:p>
+          <a:p>
+            <a:pPr lvl="1"/>
+            <a:r>
+              <a:rPr lang="en-US" dirty="0" smtClean="0"/>
+              <a:t>Compatible with older Android 2.3.3 devices thanks to </a:t>
+            </a:r>
+            <a:r>
+              <a:rPr lang="en-US" dirty="0" err="1" smtClean="0"/>
+              <a:t>ActionBarSherlock</a:t>
+            </a:r>
+            <a:endParaRPr lang="en-US" dirty="0" smtClean="0"/>
+          </a:p>
+        </p:txBody>
+      </p:sp>
+    </p:spTree>
+    <p:extLst>
+      <p:ext uri="{BB962C8B-B14F-4D97-AF65-F5344CB8AC3E}">
+        <p14:creationId xmlns:p14="http://schemas.microsoft.com/office/powerpoint/2010/main" val="413463721"/>
+      </p:ext>
+    </p:extLst>
+  </p:cSld>
+  <p:clrMapOvr>
+    <a:masterClrMapping/>
+  </p:clrMapOvr>
+  <mc:AlternateContent xmlns:mc="http://schemas.openxmlformats.org/markup-compatibility/2006" xmlns:p14="http://schemas.microsoft.com/office/powerpoint/2010/main">
+    <mc:Choice Requires="p14">
+      <p:transition p14:dur="60">
+        <p:fade/>
+      </p:transition>
+    </mc:Choice>
+    <mc:Fallback xmlns="">
+      <p:transition>
+        <p:fade/>
+      </p:transition>
+    </mc:Fallback>
+  </mc:AlternateContent>
+  <p:timing>
+    <p:tnLst>
+      <p:par>
+        <p:cTn id="1" dur="indefinite" restart="never" nodeType="tmRoot"/>
+      </p:par>
+    </p:tnLst>
+  </p:timing>
+</p:sld>
+</file>
+
+<file path=ppt/slides/slide3.xml><?xml version="1.0" encoding="utf-8"?>
+<p:sld xmlns:a="http://schemas.openxmlformats.org/drawingml/2006/main" xmlns:r="http://schemas.openxmlformats.org/officeDocument/2006/relationships" xmlns:p="http://schemas.openxmlformats.org/presentationml/2006/main">
+  <p:cSld>
+    <p:spTree>
+      <p:nvGrpSpPr>
+        <p:cNvPr id="1" name=""/>
+        <p:cNvGrpSpPr/>
+        <p:nvPr/>
+      </p:nvGrpSpPr>
+      <p:grpSpPr>
+        <a:xfrm>
+          <a:off x="0" y="0"/>
+          <a:ext cx="0" cy="0"/>
+          <a:chOff x="0" y="0"/>
+          <a:chExt cx="0" cy="0"/>
+        </a:xfrm>
+      </p:grpSpPr>
+      <p:sp>
+        <p:nvSpPr>
+          <p:cNvPr id="2" name="Title 1"/>
+          <p:cNvSpPr>
+            <a:spLocks noGrp="1"/>
+          </p:cNvSpPr>
+          <p:nvPr>
+            <p:ph type="title"/>
+          </p:nvPr>
+        </p:nvSpPr>
+        <p:spPr/>
+        <p:txBody>
+          <a:bodyPr/>
+          <a:lstStyle/>
+          <a:p>
+            <a:r>
+              <a:rPr lang="en-US" dirty="0" smtClean="0"/>
+              <a:t>technology and te</a:t>
+            </a:r>
+            <a:r>
+              <a:rPr lang="en-US" spc="0" dirty="0" smtClean="0"/>
+              <a:t>r</a:t>
+            </a:r>
+            <a:r>
+              <a:rPr lang="en-US" dirty="0" smtClean="0"/>
+              <a:t>minology</a:t>
+            </a:r>
+            <a:endParaRPr lang="en-US" dirty="0"/>
+          </a:p>
+        </p:txBody>
+      </p:sp>
+      <p:sp>
+        <p:nvSpPr>
+          <p:cNvPr id="5" name="Content Placeholder 4"/>
+          <p:cNvSpPr>
+            <a:spLocks noGrp="1"/>
+          </p:cNvSpPr>
+          <p:nvPr>
+            <p:ph sz="half" idx="2"/>
+          </p:nvPr>
+        </p:nvSpPr>
+        <p:spPr>
+          <a:xfrm>
+            <a:off x="457200" y="1524001"/>
+            <a:ext cx="5334000" cy="5333999"/>
+          </a:xfrm>
+        </p:spPr>
+        <p:txBody>
+          <a:bodyPr wrap="square">
+            <a:normAutofit fontScale="85000" lnSpcReduction="20000"/>
+          </a:bodyPr>
+          <a:lstStyle/>
+          <a:p>
+            <a:pPr>
+              <a:lnSpc>
+                <a:spcPct val="120000"/>
+              </a:lnSpc>
+            </a:pPr>
+            <a:r>
+              <a:rPr lang="en-US" dirty="0" smtClean="0"/>
+              <a:t>Amazon Web Services is a large collection of remote computing services</a:t>
+            </a:r>
+          </a:p>
+          <a:p>
+            <a:pPr lvl="1">
+              <a:lnSpc>
+                <a:spcPct val="120000"/>
+              </a:lnSpc>
+            </a:pPr>
+            <a:r>
+              <a:rPr lang="en-US" dirty="0" smtClean="0"/>
+              <a:t>Most well known of their services are Amazon S3 and Amazon EC2</a:t>
+            </a:r>
+          </a:p>
+          <a:p>
+            <a:pPr lvl="1">
+              <a:lnSpc>
+                <a:spcPct val="120000"/>
+              </a:lnSpc>
+            </a:pPr>
+            <a:r>
+              <a:rPr lang="en-US" dirty="0" smtClean="0"/>
+              <a:t>We are using a tier that is free for one year as long as we don’t exceed a certain monthly usage</a:t>
+            </a:r>
+          </a:p>
+          <a:p>
+            <a:pPr>
+              <a:lnSpc>
+                <a:spcPct val="120000"/>
+              </a:lnSpc>
+            </a:pPr>
+            <a:r>
+              <a:rPr lang="en-US" dirty="0" err="1" smtClean="0"/>
+              <a:t>ActionBarSherlock</a:t>
+            </a:r>
+            <a:r>
+              <a:rPr lang="en-US" dirty="0" smtClean="0"/>
+              <a:t> allows us to have an action bar on devices running a version of Android that predates it being built into the operating system</a:t>
+            </a:r>
+          </a:p>
+          <a:p>
+            <a:pPr>
+              <a:lnSpc>
+                <a:spcPct val="120000"/>
+              </a:lnSpc>
+            </a:pPr>
+            <a:r>
+              <a:rPr lang="en-US" dirty="0" smtClean="0"/>
+              <a:t>Android Versions</a:t>
+            </a:r>
+          </a:p>
+          <a:p>
+            <a:pPr lvl="1">
+              <a:lnSpc>
+                <a:spcPct val="120000"/>
+              </a:lnSpc>
+            </a:pPr>
+            <a:r>
+              <a:rPr lang="en-US" dirty="0" err="1" smtClean="0"/>
+              <a:t>Froyo</a:t>
+            </a:r>
+            <a:r>
+              <a:rPr lang="en-US" dirty="0" smtClean="0"/>
+              <a:t> 2.2</a:t>
+            </a:r>
+          </a:p>
+          <a:p>
+            <a:pPr lvl="1">
+              <a:lnSpc>
+                <a:spcPct val="120000"/>
+              </a:lnSpc>
+            </a:pPr>
+            <a:r>
+              <a:rPr lang="en-US" dirty="0" smtClean="0"/>
+              <a:t>Gingerbread 2.3.x</a:t>
+            </a:r>
+          </a:p>
+          <a:p>
+            <a:pPr lvl="1">
+              <a:lnSpc>
+                <a:spcPct val="120000"/>
+              </a:lnSpc>
+            </a:pPr>
+            <a:r>
+              <a:rPr lang="en-US" dirty="0" smtClean="0"/>
+              <a:t>Honeycomb 3.x.x</a:t>
+            </a:r>
+          </a:p>
+          <a:p>
+            <a:pPr lvl="1">
+              <a:lnSpc>
+                <a:spcPct val="120000"/>
+              </a:lnSpc>
+            </a:pPr>
+            <a:r>
+              <a:rPr lang="en-US" dirty="0" smtClean="0"/>
+              <a:t>Ice Cream Sandwich 4.0.x</a:t>
+            </a:r>
+          </a:p>
+          <a:p>
+            <a:pPr lvl="1">
+              <a:lnSpc>
+                <a:spcPct val="120000"/>
+              </a:lnSpc>
+            </a:pPr>
+            <a:r>
+              <a:rPr lang="en-US" dirty="0" smtClean="0"/>
+              <a:t>Jelly Bean 4.1.x</a:t>
+            </a:r>
+            <a:endParaRPr lang="en-US" dirty="0"/>
+          </a:p>
+        </p:txBody>
+      </p:sp>
+      <p:sp>
+        <p:nvSpPr>
+          <p:cNvPr id="6" name="Text Placeholder 5"/>
+          <p:cNvSpPr>
+            <a:spLocks noGrp="1"/>
+          </p:cNvSpPr>
+          <p:nvPr>
+            <p:ph type="body" sz="quarter" idx="3"/>
+          </p:nvPr>
+        </p:nvSpPr>
+        <p:spPr>
+          <a:xfrm>
+            <a:off x="6629400" y="1871409"/>
+            <a:ext cx="2209800" cy="574675"/>
+          </a:xfrm>
+        </p:spPr>
+        <p:txBody>
+          <a:bodyPr>
+            <a:normAutofit/>
+          </a:bodyPr>
+          <a:lstStyle/>
+          <a:p>
+            <a:pPr algn="ctr"/>
+            <a:r>
+              <a:rPr lang="en-US" dirty="0" smtClean="0"/>
+              <a:t>Action Bar</a:t>
+            </a:r>
+            <a:endParaRPr lang="en-US" dirty="0">
+              <a:latin typeface="HelveticaNeueLT Com 97 BlkCn" pitchFamily="34" charset="0"/>
+            </a:endParaRPr>
+          </a:p>
+        </p:txBody>
+      </p:sp>
+      <p:pic>
+        <p:nvPicPr>
+          <p:cNvPr id="8" name="Content Placeholder 7"/>
+          <p:cNvPicPr>
+            <a:picLocks noGrp="1" noChangeAspect="1"/>
+          </p:cNvPicPr>
+          <p:nvPr>
+            <p:ph sz="quarter" idx="4"/>
+          </p:nvPr>
+        </p:nvPicPr>
+        <p:blipFill>
+          <a:blip r:embed="rId2">
+            <a:extLst>
+              <a:ext uri="{28A0092B-C50C-407E-A947-70E740481C1C}">
+                <a14:useLocalDpi xmlns:a14="http://schemas.microsoft.com/office/drawing/2010/main" val="0"/>
+              </a:ext>
+            </a:extLst>
+          </a:blip>
+          <a:stretch>
+            <a:fillRect/>
+          </a:stretch>
+        </p:blipFill>
+        <p:spPr>
+          <a:xfrm>
+            <a:off x="6705600" y="2438400"/>
+            <a:ext cx="2085351" cy="3701500"/>
+          </a:xfrm>
+          <a:effectLst>
+            <a:outerShdw blurRad="76200" sx="101000" sy="101000" algn="ctr" rotWithShape="0">
+              <a:srgbClr val="535A98">
+                <a:alpha val="52000"/>
+              </a:srgbClr>
+            </a:outerShdw>
+          </a:effectLst>
+        </p:spPr>
+      </p:pic>
+      <p:sp>
+        <p:nvSpPr>
+          <p:cNvPr id="20" name="U-Turn Arrow 19"/>
+          <p:cNvSpPr/>
+          <p:nvPr/>
+        </p:nvSpPr>
+        <p:spPr>
+          <a:xfrm rot="16200000" flipH="1">
+            <a:off x="6134100" y="1950784"/>
+            <a:ext cx="609600" cy="990600"/>
+          </a:xfrm>
+          <a:prstGeom prst="uturnArrow">
+            <a:avLst>
+              <a:gd name="adj1" fmla="val 23348"/>
+              <a:gd name="adj2" fmla="val 25000"/>
+              <a:gd name="adj3" fmla="val 50105"/>
+              <a:gd name="adj4" fmla="val 43750"/>
+              <a:gd name="adj5" fmla="val 67439"/>
+            </a:avLst>
+          </a:prstGeom>
+          <a:noFill/>
+          <a:ln>
+            <a:solidFill>
+              <a:srgbClr val="8A9AA1"/>
+            </a:solidFill>
+          </a:ln>
+          <a:effectLst>
+            <a:outerShdw blurRad="50800" dist="12700" dir="5400000" algn="t" rotWithShape="0">
+              <a:srgbClr val="EF9CBB">
+                <a:alpha val="52000"/>
+              </a:srgbClr>
+            </a:outerShdw>
+          </a:effectLst>
+        </p:spPr>
+        <p:style>
+          <a:lnRef idx="2">
+            <a:schemeClr val="accent1">
+              <a:shade val="50000"/>
+            </a:schemeClr>
+          </a:lnRef>
+          <a:fillRef idx="1">
+            <a:schemeClr val="accent1"/>
+          </a:fillRef>
+          <a:effectRef idx="0">
+            <a:schemeClr val="accent1"/>
+          </a:effectRef>
+          <a:fontRef idx="minor">
+            <a:schemeClr val="lt1"/>
+          </a:fontRef>
+        </p:style>
+        <p:txBody>
+          <a:bodyPr rtlCol="0" anchor="ctr"/>
+          <a:lstStyle/>
+          <a:p>
+            <a:pPr algn="ctr"/>
+            <a:endParaRPr lang="en-US">
+              <a:solidFill>
+                <a:schemeClr val="tx1"/>
+              </a:solidFill>
+            </a:endParaRPr>
+          </a:p>
+        </p:txBody>
+      </p:sp>
+    </p:spTree>
+    <p:extLst>
+      <p:ext uri="{BB962C8B-B14F-4D97-AF65-F5344CB8AC3E}">
+        <p14:creationId xmlns:p14="http://schemas.microsoft.com/office/powerpoint/2010/main" val="2780555695"/>
+      </p:ext>
+    </p:extLst>
+  </p:cSld>
+  <p:clrMapOvr>
+    <a:masterClrMapping/>
+  </p:clrMapOvr>
+  <mc:AlternateContent xmlns:mc="http://schemas.openxmlformats.org/markup-compatibility/2006" xmlns:p14="http://schemas.microsoft.com/office/powerpoint/2010/main">
+    <mc:Choice Requires="p14">
+      <p:transition p14:dur="60">
+        <p:fade/>
+      </p:transition>
+    </mc:Choice>
+    <mc:Fallback xmlns="">
+      <p:transition>
+        <p:fade/>
+      </p:transition>
+    </mc:Fallback>
+  </mc:AlternateContent>
+  <p:timing>
+    <p:tnLst>
+      <p:par>
+        <p:cTn id="1" dur="indefinite" restart="never" nodeType="tmRoot"/>
+      </p:par>
+    </p:tnLst>
+  </p:timing>
+</p:sld>
+</file>
+
+<file path=ppt/slides/slide4.xml><?xml version="1.0" encoding="utf-8"?>
+<p:sld xmlns:a="http://schemas.openxmlformats.org/drawingml/2006/main" xmlns:r="http://schemas.openxmlformats.org/officeDocument/2006/relationships" xmlns:p="http://schemas.openxmlformats.org/presentationml/2006/main">
+  <p:cSld>
+    <p:spTree>
+      <p:nvGrpSpPr>
+        <p:cNvPr id="1" name=""/>
+        <p:cNvGrpSpPr/>
+        <p:nvPr/>
+      </p:nvGrpSpPr>
+      <p:grpSpPr>
+        <a:xfrm>
+          <a:off x="0" y="0"/>
+          <a:ext cx="0" cy="0"/>
+          <a:chOff x="0" y="0"/>
+          <a:chExt cx="0" cy="0"/>
+        </a:xfrm>
+      </p:grpSpPr>
+      <p:sp>
+        <p:nvSpPr>
+          <p:cNvPr id="2" name="Title 1"/>
+          <p:cNvSpPr>
+            <a:spLocks noGrp="1"/>
+          </p:cNvSpPr>
+          <p:nvPr>
+            <p:ph type="title"/>
+          </p:nvPr>
+        </p:nvSpPr>
+        <p:spPr/>
+        <p:txBody>
+          <a:bodyPr/>
+          <a:lstStyle/>
+          <a:p>
+            <a:r>
+              <a:rPr lang="en-US" dirty="0" smtClean="0"/>
+              <a:t>what’s it do?</a:t>
+            </a:r>
+            <a:endParaRPr lang="en-US" dirty="0"/>
+          </a:p>
+        </p:txBody>
+      </p:sp>
+      <p:sp>
+        <p:nvSpPr>
+          <p:cNvPr id="3" name="Content Placeholder 2"/>
+          <p:cNvSpPr>
+            <a:spLocks noGrp="1"/>
+          </p:cNvSpPr>
+          <p:nvPr>
+            <p:ph idx="1"/>
+          </p:nvPr>
+        </p:nvSpPr>
+        <p:spPr>
+          <a:xfrm>
+            <a:off x="457200" y="1600200"/>
+            <a:ext cx="8229600" cy="5257800"/>
+          </a:xfrm>
+        </p:spPr>
+        <p:txBody>
+          <a:bodyPr>
+            <a:normAutofit fontScale="92500" lnSpcReduction="10000"/>
+          </a:bodyPr>
+          <a:lstStyle/>
+          <a:p>
+            <a:r>
+              <a:rPr lang="en-US" dirty="0" smtClean="0"/>
+              <a:t>Users log in through Facebook and can then challenge their Facebook friends to a game of checkers</a:t>
+            </a:r>
+          </a:p>
+          <a:p>
+            <a:r>
+              <a:rPr lang="en-US" dirty="0" smtClean="0"/>
+              <a:t>New moves and games will be sent over either </a:t>
+            </a:r>
+            <a:r>
+              <a:rPr lang="en-US" dirty="0" err="1" smtClean="0"/>
+              <a:t>WiFi</a:t>
+            </a:r>
+            <a:r>
+              <a:rPr lang="en-US" dirty="0" smtClean="0"/>
+              <a:t> or a data connection to our Amazon web server to be processed</a:t>
+            </a:r>
+          </a:p>
+          <a:p>
+            <a:pPr lvl="1"/>
+            <a:r>
+              <a:rPr lang="en-US" dirty="0" smtClean="0"/>
+              <a:t>Server will then send a push notification to the receiving user’s phone to alert them of their turn</a:t>
+            </a:r>
+          </a:p>
+          <a:p>
+            <a:pPr lvl="1"/>
+            <a:r>
+              <a:rPr lang="en-US" dirty="0" smtClean="0"/>
+              <a:t>Server can also perform validation to prevent cheating</a:t>
+            </a:r>
+          </a:p>
+          <a:p>
+            <a:r>
+              <a:rPr lang="en-US" dirty="0" smtClean="0"/>
+              <a:t>To put it very simply, take Words with Friends but replace scrabble with checkers</a:t>
+            </a:r>
+            <a:endParaRPr lang="en-US" dirty="0"/>
+          </a:p>
+        </p:txBody>
+      </p:sp>
+    </p:spTree>
+    <p:extLst>
+      <p:ext uri="{BB962C8B-B14F-4D97-AF65-F5344CB8AC3E}">
+        <p14:creationId xmlns:p14="http://schemas.microsoft.com/office/powerpoint/2010/main" val="1097152770"/>
+      </p:ext>
+    </p:extLst>
+  </p:cSld>
+  <p:clrMapOvr>
+    <a:masterClrMapping/>
+  </p:clrMapOvr>
+  <mc:AlternateContent xmlns:mc="http://schemas.openxmlformats.org/markup-compatibility/2006" xmlns:p14="http://schemas.microsoft.com/office/powerpoint/2010/main">
+    <mc:Choice Requires="p14">
+      <p:transition p14:dur="60">
+        <p:fade/>
+      </p:transition>
+    </mc:Choice>
+    <mc:Fallback xmlns="">
+      <p:transition>
+        <p:fade/>
+      </p:transition>
+    </mc:Fallback>
+  </mc:AlternateContent>
+  <p:timing>
+    <p:tnLst>
+      <p:par>
+        <p:cTn id="1" dur="indefinite" restart="never" nodeType="tmRoot"/>
+      </p:par>
+    </p:tnLst>
+  </p:timing>
+</p:sld>
+</file>
+
+<file path=ppt/slides/slide5.xml><?xml version="1.0" encoding="utf-8"?>
+<p:sld xmlns:a="http://schemas.openxmlformats.org/drawingml/2006/main" xmlns:r="http://schemas.openxmlformats.org/officeDocument/2006/relationships" xmlns:p="http://schemas.openxmlformats.org/presentationml/2006/main">
+  <p:cSld>
+    <p:spTree>
+      <p:nvGrpSpPr>
+        <p:cNvPr id="1" name=""/>
+        <p:cNvGrpSpPr/>
+        <p:nvPr/>
+      </p:nvGrpSpPr>
+      <p:grpSpPr>
+        <a:xfrm>
+          <a:off x="0" y="0"/>
+          <a:ext cx="0" cy="0"/>
+          <a:chOff x="0" y="0"/>
+          <a:chExt cx="0" cy="0"/>
+        </a:xfrm>
+      </p:grpSpPr>
+      <p:sp>
+        <p:nvSpPr>
+          <p:cNvPr id="2" name="Title 1"/>
+          <p:cNvSpPr>
+            <a:spLocks noGrp="1"/>
+          </p:cNvSpPr>
+          <p:nvPr>
+            <p:ph type="title"/>
+          </p:nvPr>
+        </p:nvSpPr>
+        <p:spPr/>
+        <p:txBody>
+          <a:bodyPr/>
+          <a:lstStyle/>
+          <a:p>
+            <a:r>
+              <a:rPr lang="en-US" dirty="0" smtClean="0"/>
+              <a:t>questions?</a:t>
+            </a:r>
+            <a:endParaRPr lang="en-US" dirty="0"/>
+          </a:p>
+        </p:txBody>
+      </p:sp>
+    </p:spTree>
+    <p:extLst>
+      <p:ext uri="{BB962C8B-B14F-4D97-AF65-F5344CB8AC3E}">
+        <p14:creationId xmlns:p14="http://schemas.microsoft.com/office/powerpoint/2010/main" val="2757940110"/>
+      </p:ext>
+    </p:extLst>
+  </p:cSld>
+  <p:clrMapOvr>
+    <a:masterClrMapping/>
+  </p:clrMapOvr>
+  <mc:AlternateContent xmlns:mc="http://schemas.openxmlformats.org/markup-compatibility/2006" xmlns:p14="http://schemas.microsoft.com/office/powerpoint/2010/main">
+    <mc:Choice Requires="p14">
+      <p:transition p14:dur="60">
+        <p:fade/>
+      </p:transition>
+    </mc:Choice>
+    <mc:Fallback xmlns="">
+      <p:transition>
+        <p:fade/>
+      </p:transition>
+    </mc:Fallback>
+  </mc:AlternateContent>
+  <p:timing>
+    <p:tnLst>
+      <p:par>
+        <p:cTn id="1" dur="indefinite" restart="never" nodeType="tmRoot"/>
+      </p:par>
+    </p:tnLst>
+  </p:timing>
 </p:sld>
 </file>
 
 <file path=ppt/theme/theme1.xml><?xml version="1.0" encoding="utf-8"?>
-<a:theme xmlns:a="http://schemas.openxmlformats.org/drawingml/2006/main" name="Office Theme">
+<a:theme xmlns:a="http://schemas.openxmlformats.org/drawingml/2006/main" name="PresentationTemplate">
   <a:themeElements>
     <a:clrScheme name="Office">
       <a:dk1>

</xml_diff>